<commit_message>
about features and internal links responsive logo
</commit_message>
<xml_diff>
--- a/images/help.pptx
+++ b/images/help.pptx
@@ -10,6 +10,7 @@
     <p:sldId id="257" r:id="rId4"/>
     <p:sldId id="259" r:id="rId5"/>
     <p:sldId id="260" r:id="rId6"/>
+    <p:sldId id="261" r:id="rId7"/>
   </p:sldIdLst>
   <p:sldSz cx="9144000" cy="6858000" type="screen4x3"/>
   <p:notesSz cx="6858000" cy="9144000"/>
@@ -247,7 +248,7 @@
           <a:p>
             <a:fld id="{47B723C8-5251-49FE-8326-1E5799E3C82A}" type="datetimeFigureOut">
               <a:rPr lang="en-US" smtClean="0"/>
-              <a:t>11/23/2021</a:t>
+              <a:t>11/30/2021</a:t>
             </a:fld>
             <a:endParaRPr lang="en-US"/>
           </a:p>
@@ -417,7 +418,7 @@
           <a:p>
             <a:fld id="{47B723C8-5251-49FE-8326-1E5799E3C82A}" type="datetimeFigureOut">
               <a:rPr lang="en-US" smtClean="0"/>
-              <a:t>11/23/2021</a:t>
+              <a:t>11/30/2021</a:t>
             </a:fld>
             <a:endParaRPr lang="en-US"/>
           </a:p>
@@ -597,7 +598,7 @@
           <a:p>
             <a:fld id="{47B723C8-5251-49FE-8326-1E5799E3C82A}" type="datetimeFigureOut">
               <a:rPr lang="en-US" smtClean="0"/>
-              <a:t>11/23/2021</a:t>
+              <a:t>11/30/2021</a:t>
             </a:fld>
             <a:endParaRPr lang="en-US"/>
           </a:p>
@@ -767,7 +768,7 @@
           <a:p>
             <a:fld id="{47B723C8-5251-49FE-8326-1E5799E3C82A}" type="datetimeFigureOut">
               <a:rPr lang="en-US" smtClean="0"/>
-              <a:t>11/23/2021</a:t>
+              <a:t>11/30/2021</a:t>
             </a:fld>
             <a:endParaRPr lang="en-US"/>
           </a:p>
@@ -1011,7 +1012,7 @@
           <a:p>
             <a:fld id="{47B723C8-5251-49FE-8326-1E5799E3C82A}" type="datetimeFigureOut">
               <a:rPr lang="en-US" smtClean="0"/>
-              <a:t>11/23/2021</a:t>
+              <a:t>11/30/2021</a:t>
             </a:fld>
             <a:endParaRPr lang="en-US"/>
           </a:p>
@@ -1243,7 +1244,7 @@
           <a:p>
             <a:fld id="{47B723C8-5251-49FE-8326-1E5799E3C82A}" type="datetimeFigureOut">
               <a:rPr lang="en-US" smtClean="0"/>
-              <a:t>11/23/2021</a:t>
+              <a:t>11/30/2021</a:t>
             </a:fld>
             <a:endParaRPr lang="en-US"/>
           </a:p>
@@ -1610,7 +1611,7 @@
           <a:p>
             <a:fld id="{47B723C8-5251-49FE-8326-1E5799E3C82A}" type="datetimeFigureOut">
               <a:rPr lang="en-US" smtClean="0"/>
-              <a:t>11/23/2021</a:t>
+              <a:t>11/30/2021</a:t>
             </a:fld>
             <a:endParaRPr lang="en-US"/>
           </a:p>
@@ -1728,7 +1729,7 @@
           <a:p>
             <a:fld id="{47B723C8-5251-49FE-8326-1E5799E3C82A}" type="datetimeFigureOut">
               <a:rPr lang="en-US" smtClean="0"/>
-              <a:t>11/23/2021</a:t>
+              <a:t>11/30/2021</a:t>
             </a:fld>
             <a:endParaRPr lang="en-US"/>
           </a:p>
@@ -1823,7 +1824,7 @@
           <a:p>
             <a:fld id="{47B723C8-5251-49FE-8326-1E5799E3C82A}" type="datetimeFigureOut">
               <a:rPr lang="en-US" smtClean="0"/>
-              <a:t>11/23/2021</a:t>
+              <a:t>11/30/2021</a:t>
             </a:fld>
             <a:endParaRPr lang="en-US"/>
           </a:p>
@@ -2100,7 +2101,7 @@
           <a:p>
             <a:fld id="{47B723C8-5251-49FE-8326-1E5799E3C82A}" type="datetimeFigureOut">
               <a:rPr lang="en-US" smtClean="0"/>
-              <a:t>11/23/2021</a:t>
+              <a:t>11/30/2021</a:t>
             </a:fld>
             <a:endParaRPr lang="en-US"/>
           </a:p>
@@ -2357,7 +2358,7 @@
           <a:p>
             <a:fld id="{47B723C8-5251-49FE-8326-1E5799E3C82A}" type="datetimeFigureOut">
               <a:rPr lang="en-US" smtClean="0"/>
-              <a:t>11/23/2021</a:t>
+              <a:t>11/30/2021</a:t>
             </a:fld>
             <a:endParaRPr lang="en-US"/>
           </a:p>
@@ -2570,7 +2571,7 @@
           <a:p>
             <a:fld id="{47B723C8-5251-49FE-8326-1E5799E3C82A}" type="datetimeFigureOut">
               <a:rPr lang="en-US" smtClean="0"/>
-              <a:t>11/23/2021</a:t>
+              <a:t>11/30/2021</a:t>
             </a:fld>
             <a:endParaRPr lang="en-US"/>
           </a:p>
@@ -11093,6 +11094,2542 @@
 </p:sld>
 </file>
 
+<file path=ppt/slides/slide6.xml><?xml version="1.0" encoding="utf-8"?>
+<p:sld xmlns:a="http://schemas.openxmlformats.org/drawingml/2006/main" xmlns:r="http://schemas.openxmlformats.org/officeDocument/2006/relationships" xmlns:p="http://schemas.openxmlformats.org/presentationml/2006/main">
+  <p:cSld>
+    <p:spTree>
+      <p:nvGrpSpPr>
+        <p:cNvPr id="1" name=""/>
+        <p:cNvGrpSpPr/>
+        <p:nvPr/>
+      </p:nvGrpSpPr>
+      <p:grpSpPr>
+        <a:xfrm>
+          <a:off x="0" y="0"/>
+          <a:ext cx="0" cy="0"/>
+          <a:chOff x="0" y="0"/>
+          <a:chExt cx="0" cy="0"/>
+        </a:xfrm>
+      </p:grpSpPr>
+      <p:cxnSp>
+        <p:nvCxnSpPr>
+          <p:cNvPr id="6" name="Straight Arrow Connector 5">
+            <a:extLst>
+              <a:ext uri="{FF2B5EF4-FFF2-40B4-BE49-F238E27FC236}">
+                <a16:creationId xmlns:a16="http://schemas.microsoft.com/office/drawing/2014/main" id="{C7EAA981-81A8-48B8-8919-932F15A1C6C5}"/>
+              </a:ext>
+            </a:extLst>
+          </p:cNvPr>
+          <p:cNvCxnSpPr>
+            <a:cxnSpLocks/>
+          </p:cNvCxnSpPr>
+          <p:nvPr/>
+        </p:nvCxnSpPr>
+        <p:spPr>
+          <a:xfrm>
+            <a:off x="1088138" y="2263574"/>
+            <a:ext cx="335425" cy="0"/>
+          </a:xfrm>
+          <a:prstGeom prst="straightConnector1">
+            <a:avLst/>
+          </a:prstGeom>
+          <a:ln w="76200">
+            <a:solidFill>
+              <a:srgbClr val="3BB752"/>
+            </a:solidFill>
+            <a:headEnd type="none" w="med" len="med"/>
+            <a:tailEnd type="none" w="med" len="med"/>
+          </a:ln>
+        </p:spPr>
+        <p:style>
+          <a:lnRef idx="1">
+            <a:schemeClr val="accent1"/>
+          </a:lnRef>
+          <a:fillRef idx="0">
+            <a:schemeClr val="accent1"/>
+          </a:fillRef>
+          <a:effectRef idx="0">
+            <a:schemeClr val="accent1"/>
+          </a:effectRef>
+          <a:fontRef idx="minor">
+            <a:schemeClr val="tx1"/>
+          </a:fontRef>
+        </p:style>
+      </p:cxnSp>
+      <p:cxnSp>
+        <p:nvCxnSpPr>
+          <p:cNvPr id="11" name="Straight Arrow Connector 10">
+            <a:extLst>
+              <a:ext uri="{FF2B5EF4-FFF2-40B4-BE49-F238E27FC236}">
+                <a16:creationId xmlns:a16="http://schemas.microsoft.com/office/drawing/2014/main" id="{678FED5E-8AF6-4AB4-A090-596A42F0CEBB}"/>
+              </a:ext>
+            </a:extLst>
+          </p:cNvPr>
+          <p:cNvCxnSpPr>
+            <a:cxnSpLocks/>
+          </p:cNvCxnSpPr>
+          <p:nvPr/>
+        </p:nvCxnSpPr>
+        <p:spPr>
+          <a:xfrm>
+            <a:off x="1088137" y="2535037"/>
+            <a:ext cx="335425" cy="0"/>
+          </a:xfrm>
+          <a:prstGeom prst="straightConnector1">
+            <a:avLst/>
+          </a:prstGeom>
+          <a:ln w="76200">
+            <a:solidFill>
+              <a:srgbClr val="3BB752"/>
+            </a:solidFill>
+            <a:headEnd type="none" w="med" len="med"/>
+            <a:tailEnd type="none" w="med" len="med"/>
+          </a:ln>
+        </p:spPr>
+        <p:style>
+          <a:lnRef idx="1">
+            <a:schemeClr val="accent1"/>
+          </a:lnRef>
+          <a:fillRef idx="0">
+            <a:schemeClr val="accent1"/>
+          </a:fillRef>
+          <a:effectRef idx="0">
+            <a:schemeClr val="accent1"/>
+          </a:effectRef>
+          <a:fontRef idx="minor">
+            <a:schemeClr val="tx1"/>
+          </a:fontRef>
+        </p:style>
+      </p:cxnSp>
+      <p:cxnSp>
+        <p:nvCxnSpPr>
+          <p:cNvPr id="12" name="Straight Arrow Connector 11">
+            <a:extLst>
+              <a:ext uri="{FF2B5EF4-FFF2-40B4-BE49-F238E27FC236}">
+                <a16:creationId xmlns:a16="http://schemas.microsoft.com/office/drawing/2014/main" id="{9A151E22-6C00-4062-AA39-49D24C2E812B}"/>
+              </a:ext>
+            </a:extLst>
+          </p:cNvPr>
+          <p:cNvCxnSpPr>
+            <a:cxnSpLocks/>
+          </p:cNvCxnSpPr>
+          <p:nvPr/>
+        </p:nvCxnSpPr>
+        <p:spPr>
+          <a:xfrm flipV="1">
+            <a:off x="1253373" y="2226941"/>
+            <a:ext cx="0" cy="308096"/>
+          </a:xfrm>
+          <a:prstGeom prst="straightConnector1">
+            <a:avLst/>
+          </a:prstGeom>
+          <a:ln w="76200">
+            <a:solidFill>
+              <a:srgbClr val="3BB752"/>
+            </a:solidFill>
+            <a:headEnd type="none" w="med" len="med"/>
+            <a:tailEnd type="none" w="med" len="med"/>
+          </a:ln>
+        </p:spPr>
+        <p:style>
+          <a:lnRef idx="1">
+            <a:schemeClr val="accent1"/>
+          </a:lnRef>
+          <a:fillRef idx="0">
+            <a:schemeClr val="accent1"/>
+          </a:fillRef>
+          <a:effectRef idx="0">
+            <a:schemeClr val="accent1"/>
+          </a:effectRef>
+          <a:fontRef idx="minor">
+            <a:schemeClr val="tx1"/>
+          </a:fontRef>
+        </p:style>
+      </p:cxnSp>
+      <p:sp>
+        <p:nvSpPr>
+          <p:cNvPr id="14" name="Oval 13">
+            <a:extLst>
+              <a:ext uri="{FF2B5EF4-FFF2-40B4-BE49-F238E27FC236}">
+                <a16:creationId xmlns:a16="http://schemas.microsoft.com/office/drawing/2014/main" id="{BB9A5D81-50FF-4DCD-8D4C-0CAFB365B16A}"/>
+              </a:ext>
+            </a:extLst>
+          </p:cNvPr>
+          <p:cNvSpPr/>
+          <p:nvPr/>
+        </p:nvSpPr>
+        <p:spPr>
+          <a:xfrm>
+            <a:off x="1614649" y="2254259"/>
+            <a:ext cx="299876" cy="299876"/>
+          </a:xfrm>
+          <a:prstGeom prst="ellipse">
+            <a:avLst/>
+          </a:prstGeom>
+          <a:ln w="76200">
+            <a:solidFill>
+              <a:srgbClr val="3BB752"/>
+            </a:solidFill>
+            <a:headEnd type="none" w="med" len="med"/>
+            <a:tailEnd type="none" w="med" len="med"/>
+          </a:ln>
+        </p:spPr>
+        <p:style>
+          <a:lnRef idx="1">
+            <a:schemeClr val="accent1"/>
+          </a:lnRef>
+          <a:fillRef idx="0">
+            <a:schemeClr val="accent1"/>
+          </a:fillRef>
+          <a:effectRef idx="0">
+            <a:schemeClr val="accent1"/>
+          </a:effectRef>
+          <a:fontRef idx="minor">
+            <a:schemeClr val="tx1"/>
+          </a:fontRef>
+        </p:style>
+        <p:txBody>
+          <a:bodyPr rtlCol="0" anchor="ctr"/>
+          <a:lstStyle/>
+          <a:p>
+            <a:pPr algn="ctr"/>
+            <a:endParaRPr lang="en-US"/>
+          </a:p>
+        </p:txBody>
+      </p:sp>
+      <p:cxnSp>
+        <p:nvCxnSpPr>
+          <p:cNvPr id="15" name="Straight Arrow Connector 14">
+            <a:extLst>
+              <a:ext uri="{FF2B5EF4-FFF2-40B4-BE49-F238E27FC236}">
+                <a16:creationId xmlns:a16="http://schemas.microsoft.com/office/drawing/2014/main" id="{52E8F22C-76B4-436F-81DC-F5FF4844F01D}"/>
+              </a:ext>
+            </a:extLst>
+          </p:cNvPr>
+          <p:cNvCxnSpPr>
+            <a:cxnSpLocks/>
+          </p:cNvCxnSpPr>
+          <p:nvPr/>
+        </p:nvCxnSpPr>
+        <p:spPr>
+          <a:xfrm>
+            <a:off x="2102551" y="2266718"/>
+            <a:ext cx="335425" cy="0"/>
+          </a:xfrm>
+          <a:prstGeom prst="straightConnector1">
+            <a:avLst/>
+          </a:prstGeom>
+          <a:ln w="76200">
+            <a:solidFill>
+              <a:srgbClr val="3BB752"/>
+            </a:solidFill>
+            <a:headEnd type="none" w="med" len="med"/>
+            <a:tailEnd type="none" w="med" len="med"/>
+          </a:ln>
+        </p:spPr>
+        <p:style>
+          <a:lnRef idx="1">
+            <a:schemeClr val="accent1"/>
+          </a:lnRef>
+          <a:fillRef idx="0">
+            <a:schemeClr val="accent1"/>
+          </a:fillRef>
+          <a:effectRef idx="0">
+            <a:schemeClr val="accent1"/>
+          </a:effectRef>
+          <a:fontRef idx="minor">
+            <a:schemeClr val="tx1"/>
+          </a:fontRef>
+        </p:style>
+      </p:cxnSp>
+      <p:cxnSp>
+        <p:nvCxnSpPr>
+          <p:cNvPr id="16" name="Straight Arrow Connector 15">
+            <a:extLst>
+              <a:ext uri="{FF2B5EF4-FFF2-40B4-BE49-F238E27FC236}">
+                <a16:creationId xmlns:a16="http://schemas.microsoft.com/office/drawing/2014/main" id="{50C3E440-C07B-4D31-BFAB-1C2E161706DB}"/>
+              </a:ext>
+            </a:extLst>
+          </p:cNvPr>
+          <p:cNvCxnSpPr>
+            <a:cxnSpLocks/>
+          </p:cNvCxnSpPr>
+          <p:nvPr/>
+        </p:nvCxnSpPr>
+        <p:spPr>
+          <a:xfrm>
+            <a:off x="2102550" y="2538181"/>
+            <a:ext cx="335425" cy="0"/>
+          </a:xfrm>
+          <a:prstGeom prst="straightConnector1">
+            <a:avLst/>
+          </a:prstGeom>
+          <a:ln w="76200">
+            <a:solidFill>
+              <a:srgbClr val="3BB752"/>
+            </a:solidFill>
+            <a:headEnd type="none" w="med" len="med"/>
+            <a:tailEnd type="none" w="med" len="med"/>
+          </a:ln>
+        </p:spPr>
+        <p:style>
+          <a:lnRef idx="1">
+            <a:schemeClr val="accent1"/>
+          </a:lnRef>
+          <a:fillRef idx="0">
+            <a:schemeClr val="accent1"/>
+          </a:fillRef>
+          <a:effectRef idx="0">
+            <a:schemeClr val="accent1"/>
+          </a:effectRef>
+          <a:fontRef idx="minor">
+            <a:schemeClr val="tx1"/>
+          </a:fontRef>
+        </p:style>
+      </p:cxnSp>
+      <p:cxnSp>
+        <p:nvCxnSpPr>
+          <p:cNvPr id="17" name="Straight Arrow Connector 16">
+            <a:extLst>
+              <a:ext uri="{FF2B5EF4-FFF2-40B4-BE49-F238E27FC236}">
+                <a16:creationId xmlns:a16="http://schemas.microsoft.com/office/drawing/2014/main" id="{553D9DC3-8E8E-4A86-9EE0-E5FFCC72EE33}"/>
+              </a:ext>
+            </a:extLst>
+          </p:cNvPr>
+          <p:cNvCxnSpPr>
+            <a:cxnSpLocks/>
+          </p:cNvCxnSpPr>
+          <p:nvPr/>
+        </p:nvCxnSpPr>
+        <p:spPr>
+          <a:xfrm flipV="1">
+            <a:off x="2139196" y="2238305"/>
+            <a:ext cx="0" cy="308096"/>
+          </a:xfrm>
+          <a:prstGeom prst="straightConnector1">
+            <a:avLst/>
+          </a:prstGeom>
+          <a:ln w="76200">
+            <a:solidFill>
+              <a:srgbClr val="3BB752"/>
+            </a:solidFill>
+            <a:headEnd type="none" w="med" len="med"/>
+            <a:tailEnd type="none" w="med" len="med"/>
+          </a:ln>
+        </p:spPr>
+        <p:style>
+          <a:lnRef idx="1">
+            <a:schemeClr val="accent1"/>
+          </a:lnRef>
+          <a:fillRef idx="0">
+            <a:schemeClr val="accent1"/>
+          </a:fillRef>
+          <a:effectRef idx="0">
+            <a:schemeClr val="accent1"/>
+          </a:effectRef>
+          <a:fontRef idx="minor">
+            <a:schemeClr val="tx1"/>
+          </a:fontRef>
+        </p:style>
+      </p:cxnSp>
+      <p:sp>
+        <p:nvSpPr>
+          <p:cNvPr id="18" name="Rectangle 17">
+            <a:extLst>
+              <a:ext uri="{FF2B5EF4-FFF2-40B4-BE49-F238E27FC236}">
+                <a16:creationId xmlns:a16="http://schemas.microsoft.com/office/drawing/2014/main" id="{8D834650-5FB3-4B86-8472-23804BF7EB07}"/>
+              </a:ext>
+            </a:extLst>
+          </p:cNvPr>
+          <p:cNvSpPr/>
+          <p:nvPr/>
+        </p:nvSpPr>
+        <p:spPr>
+          <a:xfrm>
+            <a:off x="1099360" y="1647383"/>
+            <a:ext cx="335423" cy="308096"/>
+          </a:xfrm>
+          <a:prstGeom prst="rect">
+            <a:avLst/>
+          </a:prstGeom>
+          <a:solidFill>
+            <a:srgbClr val="3BB752"/>
+          </a:solidFill>
+          <a:ln w="76200">
+            <a:solidFill>
+              <a:srgbClr val="3BB752"/>
+            </a:solidFill>
+            <a:headEnd type="none" w="med" len="med"/>
+            <a:tailEnd type="none" w="med" len="med"/>
+          </a:ln>
+        </p:spPr>
+        <p:style>
+          <a:lnRef idx="1">
+            <a:schemeClr val="accent1"/>
+          </a:lnRef>
+          <a:fillRef idx="0">
+            <a:schemeClr val="accent1"/>
+          </a:fillRef>
+          <a:effectRef idx="0">
+            <a:schemeClr val="accent1"/>
+          </a:effectRef>
+          <a:fontRef idx="minor">
+            <a:schemeClr val="tx1"/>
+          </a:fontRef>
+        </p:style>
+        <p:txBody>
+          <a:bodyPr rtlCol="0" anchor="ctr"/>
+          <a:lstStyle/>
+          <a:p>
+            <a:pPr algn="ctr"/>
+            <a:endParaRPr lang="en-US"/>
+          </a:p>
+        </p:txBody>
+      </p:sp>
+      <p:sp>
+        <p:nvSpPr>
+          <p:cNvPr id="19" name="Rectangle 18">
+            <a:extLst>
+              <a:ext uri="{FF2B5EF4-FFF2-40B4-BE49-F238E27FC236}">
+                <a16:creationId xmlns:a16="http://schemas.microsoft.com/office/drawing/2014/main" id="{A624414A-F9DE-4D92-A8DD-16BF889BB014}"/>
+              </a:ext>
+            </a:extLst>
+          </p:cNvPr>
+          <p:cNvSpPr/>
+          <p:nvPr/>
+        </p:nvSpPr>
+        <p:spPr>
+          <a:xfrm>
+            <a:off x="1596875" y="1099284"/>
+            <a:ext cx="335423" cy="856195"/>
+          </a:xfrm>
+          <a:prstGeom prst="rect">
+            <a:avLst/>
+          </a:prstGeom>
+          <a:solidFill>
+            <a:srgbClr val="3BB752"/>
+          </a:solidFill>
+          <a:ln w="76200">
+            <a:solidFill>
+              <a:srgbClr val="3BB752"/>
+            </a:solidFill>
+            <a:headEnd type="none" w="med" len="med"/>
+            <a:tailEnd type="none" w="med" len="med"/>
+          </a:ln>
+        </p:spPr>
+        <p:style>
+          <a:lnRef idx="1">
+            <a:schemeClr val="accent1"/>
+          </a:lnRef>
+          <a:fillRef idx="0">
+            <a:schemeClr val="accent1"/>
+          </a:fillRef>
+          <a:effectRef idx="0">
+            <a:schemeClr val="accent1"/>
+          </a:effectRef>
+          <a:fontRef idx="minor">
+            <a:schemeClr val="tx1"/>
+          </a:fontRef>
+        </p:style>
+        <p:txBody>
+          <a:bodyPr rtlCol="0" anchor="ctr"/>
+          <a:lstStyle/>
+          <a:p>
+            <a:pPr algn="ctr"/>
+            <a:endParaRPr lang="en-US"/>
+          </a:p>
+        </p:txBody>
+      </p:sp>
+      <p:sp>
+        <p:nvSpPr>
+          <p:cNvPr id="20" name="Rectangle 19">
+            <a:extLst>
+              <a:ext uri="{FF2B5EF4-FFF2-40B4-BE49-F238E27FC236}">
+                <a16:creationId xmlns:a16="http://schemas.microsoft.com/office/drawing/2014/main" id="{BCDE2C53-1050-446A-92AA-633D859FA66E}"/>
+              </a:ext>
+            </a:extLst>
+          </p:cNvPr>
+          <p:cNvSpPr/>
+          <p:nvPr/>
+        </p:nvSpPr>
+        <p:spPr>
+          <a:xfrm>
+            <a:off x="2094390" y="1398277"/>
+            <a:ext cx="335423" cy="545196"/>
+          </a:xfrm>
+          <a:prstGeom prst="rect">
+            <a:avLst/>
+          </a:prstGeom>
+          <a:solidFill>
+            <a:srgbClr val="3BB752"/>
+          </a:solidFill>
+          <a:ln w="76200">
+            <a:solidFill>
+              <a:srgbClr val="3BB752"/>
+            </a:solidFill>
+            <a:headEnd type="none" w="med" len="med"/>
+            <a:tailEnd type="none" w="med" len="med"/>
+          </a:ln>
+        </p:spPr>
+        <p:style>
+          <a:lnRef idx="1">
+            <a:schemeClr val="accent1"/>
+          </a:lnRef>
+          <a:fillRef idx="0">
+            <a:schemeClr val="accent1"/>
+          </a:fillRef>
+          <a:effectRef idx="0">
+            <a:schemeClr val="accent1"/>
+          </a:effectRef>
+          <a:fontRef idx="minor">
+            <a:schemeClr val="tx1"/>
+          </a:fontRef>
+        </p:style>
+        <p:txBody>
+          <a:bodyPr rtlCol="0" anchor="ctr"/>
+          <a:lstStyle/>
+          <a:p>
+            <a:pPr algn="ctr"/>
+            <a:endParaRPr lang="en-US"/>
+          </a:p>
+        </p:txBody>
+      </p:sp>
+      <p:cxnSp>
+        <p:nvCxnSpPr>
+          <p:cNvPr id="21" name="Straight Arrow Connector 20">
+            <a:extLst>
+              <a:ext uri="{FF2B5EF4-FFF2-40B4-BE49-F238E27FC236}">
+                <a16:creationId xmlns:a16="http://schemas.microsoft.com/office/drawing/2014/main" id="{740B35C6-72BF-4B23-B084-91B182A23FAC}"/>
+              </a:ext>
+            </a:extLst>
+          </p:cNvPr>
+          <p:cNvCxnSpPr>
+            <a:cxnSpLocks/>
+          </p:cNvCxnSpPr>
+          <p:nvPr/>
+        </p:nvCxnSpPr>
+        <p:spPr>
+          <a:xfrm>
+            <a:off x="3631313" y="1518806"/>
+            <a:ext cx="335425" cy="0"/>
+          </a:xfrm>
+          <a:prstGeom prst="straightConnector1">
+            <a:avLst/>
+          </a:prstGeom>
+          <a:ln w="76200">
+            <a:solidFill>
+              <a:srgbClr val="3BB752"/>
+            </a:solidFill>
+            <a:headEnd type="none" w="med" len="med"/>
+            <a:tailEnd type="none" w="med" len="med"/>
+          </a:ln>
+        </p:spPr>
+        <p:style>
+          <a:lnRef idx="1">
+            <a:schemeClr val="accent1"/>
+          </a:lnRef>
+          <a:fillRef idx="0">
+            <a:schemeClr val="accent1"/>
+          </a:fillRef>
+          <a:effectRef idx="0">
+            <a:schemeClr val="accent1"/>
+          </a:effectRef>
+          <a:fontRef idx="minor">
+            <a:schemeClr val="tx1"/>
+          </a:fontRef>
+        </p:style>
+      </p:cxnSp>
+      <p:cxnSp>
+        <p:nvCxnSpPr>
+          <p:cNvPr id="22" name="Straight Arrow Connector 21">
+            <a:extLst>
+              <a:ext uri="{FF2B5EF4-FFF2-40B4-BE49-F238E27FC236}">
+                <a16:creationId xmlns:a16="http://schemas.microsoft.com/office/drawing/2014/main" id="{70432940-7CF8-4EFE-BE13-5B66E06FD379}"/>
+              </a:ext>
+            </a:extLst>
+          </p:cNvPr>
+          <p:cNvCxnSpPr>
+            <a:cxnSpLocks/>
+          </p:cNvCxnSpPr>
+          <p:nvPr/>
+        </p:nvCxnSpPr>
+        <p:spPr>
+          <a:xfrm>
+            <a:off x="3631312" y="1790269"/>
+            <a:ext cx="335425" cy="0"/>
+          </a:xfrm>
+          <a:prstGeom prst="straightConnector1">
+            <a:avLst/>
+          </a:prstGeom>
+          <a:ln w="76200">
+            <a:solidFill>
+              <a:srgbClr val="3BB752"/>
+            </a:solidFill>
+            <a:headEnd type="none" w="med" len="med"/>
+            <a:tailEnd type="none" w="med" len="med"/>
+          </a:ln>
+        </p:spPr>
+        <p:style>
+          <a:lnRef idx="1">
+            <a:schemeClr val="accent1"/>
+          </a:lnRef>
+          <a:fillRef idx="0">
+            <a:schemeClr val="accent1"/>
+          </a:fillRef>
+          <a:effectRef idx="0">
+            <a:schemeClr val="accent1"/>
+          </a:effectRef>
+          <a:fontRef idx="minor">
+            <a:schemeClr val="tx1"/>
+          </a:fontRef>
+        </p:style>
+      </p:cxnSp>
+      <p:cxnSp>
+        <p:nvCxnSpPr>
+          <p:cNvPr id="23" name="Straight Arrow Connector 22">
+            <a:extLst>
+              <a:ext uri="{FF2B5EF4-FFF2-40B4-BE49-F238E27FC236}">
+                <a16:creationId xmlns:a16="http://schemas.microsoft.com/office/drawing/2014/main" id="{AE012A2E-FC35-44C0-814B-2BA683C44F8D}"/>
+              </a:ext>
+            </a:extLst>
+          </p:cNvPr>
+          <p:cNvCxnSpPr>
+            <a:cxnSpLocks/>
+          </p:cNvCxnSpPr>
+          <p:nvPr/>
+        </p:nvCxnSpPr>
+        <p:spPr>
+          <a:xfrm flipV="1">
+            <a:off x="3796548" y="1482173"/>
+            <a:ext cx="0" cy="308096"/>
+          </a:xfrm>
+          <a:prstGeom prst="straightConnector1">
+            <a:avLst/>
+          </a:prstGeom>
+          <a:ln w="76200">
+            <a:solidFill>
+              <a:srgbClr val="3BB752"/>
+            </a:solidFill>
+            <a:headEnd type="none" w="med" len="med"/>
+            <a:tailEnd type="none" w="med" len="med"/>
+          </a:ln>
+        </p:spPr>
+        <p:style>
+          <a:lnRef idx="1">
+            <a:schemeClr val="accent1"/>
+          </a:lnRef>
+          <a:fillRef idx="0">
+            <a:schemeClr val="accent1"/>
+          </a:fillRef>
+          <a:effectRef idx="0">
+            <a:schemeClr val="accent1"/>
+          </a:effectRef>
+          <a:fontRef idx="minor">
+            <a:schemeClr val="tx1"/>
+          </a:fontRef>
+        </p:style>
+      </p:cxnSp>
+      <p:cxnSp>
+        <p:nvCxnSpPr>
+          <p:cNvPr id="24" name="Straight Arrow Connector 23">
+            <a:extLst>
+              <a:ext uri="{FF2B5EF4-FFF2-40B4-BE49-F238E27FC236}">
+                <a16:creationId xmlns:a16="http://schemas.microsoft.com/office/drawing/2014/main" id="{DDCCF030-6C42-48FA-9E76-66DC7AEB254C}"/>
+              </a:ext>
+            </a:extLst>
+          </p:cNvPr>
+          <p:cNvCxnSpPr>
+            <a:cxnSpLocks/>
+          </p:cNvCxnSpPr>
+          <p:nvPr/>
+        </p:nvCxnSpPr>
+        <p:spPr>
+          <a:xfrm>
+            <a:off x="4747507" y="638859"/>
+            <a:ext cx="335425" cy="0"/>
+          </a:xfrm>
+          <a:prstGeom prst="straightConnector1">
+            <a:avLst/>
+          </a:prstGeom>
+          <a:ln w="76200">
+            <a:solidFill>
+              <a:srgbClr val="3BB752"/>
+            </a:solidFill>
+            <a:headEnd type="none" w="med" len="med"/>
+            <a:tailEnd type="none" w="med" len="med"/>
+          </a:ln>
+        </p:spPr>
+        <p:style>
+          <a:lnRef idx="1">
+            <a:schemeClr val="accent1"/>
+          </a:lnRef>
+          <a:fillRef idx="0">
+            <a:schemeClr val="accent1"/>
+          </a:fillRef>
+          <a:effectRef idx="0">
+            <a:schemeClr val="accent1"/>
+          </a:effectRef>
+          <a:fontRef idx="minor">
+            <a:schemeClr val="tx1"/>
+          </a:fontRef>
+        </p:style>
+      </p:cxnSp>
+      <p:cxnSp>
+        <p:nvCxnSpPr>
+          <p:cNvPr id="25" name="Straight Arrow Connector 24">
+            <a:extLst>
+              <a:ext uri="{FF2B5EF4-FFF2-40B4-BE49-F238E27FC236}">
+                <a16:creationId xmlns:a16="http://schemas.microsoft.com/office/drawing/2014/main" id="{32043375-CDEF-45B0-BBCB-482BBC29439B}"/>
+              </a:ext>
+            </a:extLst>
+          </p:cNvPr>
+          <p:cNvCxnSpPr>
+            <a:cxnSpLocks/>
+          </p:cNvCxnSpPr>
+          <p:nvPr/>
+        </p:nvCxnSpPr>
+        <p:spPr>
+          <a:xfrm>
+            <a:off x="4747506" y="1086002"/>
+            <a:ext cx="335425" cy="0"/>
+          </a:xfrm>
+          <a:prstGeom prst="straightConnector1">
+            <a:avLst/>
+          </a:prstGeom>
+          <a:ln w="76200">
+            <a:solidFill>
+              <a:srgbClr val="3BB752"/>
+            </a:solidFill>
+            <a:headEnd type="none" w="med" len="med"/>
+            <a:tailEnd type="none" w="med" len="med"/>
+          </a:ln>
+        </p:spPr>
+        <p:style>
+          <a:lnRef idx="1">
+            <a:schemeClr val="accent1"/>
+          </a:lnRef>
+          <a:fillRef idx="0">
+            <a:schemeClr val="accent1"/>
+          </a:fillRef>
+          <a:effectRef idx="0">
+            <a:schemeClr val="accent1"/>
+          </a:effectRef>
+          <a:fontRef idx="minor">
+            <a:schemeClr val="tx1"/>
+          </a:fontRef>
+        </p:style>
+      </p:cxnSp>
+      <p:cxnSp>
+        <p:nvCxnSpPr>
+          <p:cNvPr id="26" name="Straight Arrow Connector 25">
+            <a:extLst>
+              <a:ext uri="{FF2B5EF4-FFF2-40B4-BE49-F238E27FC236}">
+                <a16:creationId xmlns:a16="http://schemas.microsoft.com/office/drawing/2014/main" id="{905D51E5-612C-48C0-8031-2A1B61CCEB40}"/>
+              </a:ext>
+            </a:extLst>
+          </p:cNvPr>
+          <p:cNvCxnSpPr>
+            <a:cxnSpLocks/>
+          </p:cNvCxnSpPr>
+          <p:nvPr/>
+        </p:nvCxnSpPr>
+        <p:spPr>
+          <a:xfrm flipV="1">
+            <a:off x="4926194" y="628279"/>
+            <a:ext cx="0" cy="457723"/>
+          </a:xfrm>
+          <a:prstGeom prst="straightConnector1">
+            <a:avLst/>
+          </a:prstGeom>
+          <a:ln w="76200">
+            <a:solidFill>
+              <a:srgbClr val="3BB752"/>
+            </a:solidFill>
+            <a:headEnd type="none" w="med" len="med"/>
+            <a:tailEnd type="none" w="med" len="med"/>
+          </a:ln>
+        </p:spPr>
+        <p:style>
+          <a:lnRef idx="1">
+            <a:schemeClr val="accent1"/>
+          </a:lnRef>
+          <a:fillRef idx="0">
+            <a:schemeClr val="accent1"/>
+          </a:fillRef>
+          <a:effectRef idx="0">
+            <a:schemeClr val="accent1"/>
+          </a:effectRef>
+          <a:fontRef idx="minor">
+            <a:schemeClr val="tx1"/>
+          </a:fontRef>
+        </p:style>
+      </p:cxnSp>
+      <p:cxnSp>
+        <p:nvCxnSpPr>
+          <p:cNvPr id="27" name="Straight Arrow Connector 26">
+            <a:extLst>
+              <a:ext uri="{FF2B5EF4-FFF2-40B4-BE49-F238E27FC236}">
+                <a16:creationId xmlns:a16="http://schemas.microsoft.com/office/drawing/2014/main" id="{3444D686-B4DE-48E0-8119-8DFBC57C7EA6}"/>
+              </a:ext>
+            </a:extLst>
+          </p:cNvPr>
+          <p:cNvCxnSpPr>
+            <a:cxnSpLocks/>
+          </p:cNvCxnSpPr>
+          <p:nvPr/>
+        </p:nvCxnSpPr>
+        <p:spPr>
+          <a:xfrm>
+            <a:off x="4954770" y="1509281"/>
+            <a:ext cx="335425" cy="0"/>
+          </a:xfrm>
+          <a:prstGeom prst="straightConnector1">
+            <a:avLst/>
+          </a:prstGeom>
+          <a:ln w="76200">
+            <a:solidFill>
+              <a:srgbClr val="3BB752"/>
+            </a:solidFill>
+            <a:headEnd type="none" w="med" len="med"/>
+            <a:tailEnd type="none" w="med" len="med"/>
+          </a:ln>
+        </p:spPr>
+        <p:style>
+          <a:lnRef idx="1">
+            <a:schemeClr val="accent1"/>
+          </a:lnRef>
+          <a:fillRef idx="0">
+            <a:schemeClr val="accent1"/>
+          </a:fillRef>
+          <a:effectRef idx="0">
+            <a:schemeClr val="accent1"/>
+          </a:effectRef>
+          <a:fontRef idx="minor">
+            <a:schemeClr val="tx1"/>
+          </a:fontRef>
+        </p:style>
+      </p:cxnSp>
+      <p:cxnSp>
+        <p:nvCxnSpPr>
+          <p:cNvPr id="28" name="Straight Arrow Connector 27">
+            <a:extLst>
+              <a:ext uri="{FF2B5EF4-FFF2-40B4-BE49-F238E27FC236}">
+                <a16:creationId xmlns:a16="http://schemas.microsoft.com/office/drawing/2014/main" id="{96ED3266-3B54-4A8B-BD3D-A935362DF63D}"/>
+              </a:ext>
+            </a:extLst>
+          </p:cNvPr>
+          <p:cNvCxnSpPr>
+            <a:cxnSpLocks/>
+          </p:cNvCxnSpPr>
+          <p:nvPr/>
+        </p:nvCxnSpPr>
+        <p:spPr>
+          <a:xfrm>
+            <a:off x="4954769" y="1790269"/>
+            <a:ext cx="335425" cy="0"/>
+          </a:xfrm>
+          <a:prstGeom prst="straightConnector1">
+            <a:avLst/>
+          </a:prstGeom>
+          <a:ln w="76200">
+            <a:solidFill>
+              <a:srgbClr val="3BB752"/>
+            </a:solidFill>
+            <a:headEnd type="none" w="med" len="med"/>
+            <a:tailEnd type="none" w="med" len="med"/>
+          </a:ln>
+        </p:spPr>
+        <p:style>
+          <a:lnRef idx="1">
+            <a:schemeClr val="accent1"/>
+          </a:lnRef>
+          <a:fillRef idx="0">
+            <a:schemeClr val="accent1"/>
+          </a:fillRef>
+          <a:effectRef idx="0">
+            <a:schemeClr val="accent1"/>
+          </a:effectRef>
+          <a:fontRef idx="minor">
+            <a:schemeClr val="tx1"/>
+          </a:fontRef>
+        </p:style>
+      </p:cxnSp>
+      <p:cxnSp>
+        <p:nvCxnSpPr>
+          <p:cNvPr id="29" name="Straight Arrow Connector 28">
+            <a:extLst>
+              <a:ext uri="{FF2B5EF4-FFF2-40B4-BE49-F238E27FC236}">
+                <a16:creationId xmlns:a16="http://schemas.microsoft.com/office/drawing/2014/main" id="{F4B4DC74-70FD-42A0-AF99-FDDABFC3F507}"/>
+              </a:ext>
+            </a:extLst>
+          </p:cNvPr>
+          <p:cNvCxnSpPr>
+            <a:cxnSpLocks/>
+          </p:cNvCxnSpPr>
+          <p:nvPr/>
+        </p:nvCxnSpPr>
+        <p:spPr>
+          <a:xfrm flipV="1">
+            <a:off x="5118608" y="1482173"/>
+            <a:ext cx="0" cy="308096"/>
+          </a:xfrm>
+          <a:prstGeom prst="straightConnector1">
+            <a:avLst/>
+          </a:prstGeom>
+          <a:ln w="193675">
+            <a:solidFill>
+              <a:srgbClr val="3BB752"/>
+            </a:solidFill>
+            <a:headEnd type="none" w="med" len="med"/>
+            <a:tailEnd type="none" w="med" len="med"/>
+          </a:ln>
+        </p:spPr>
+        <p:style>
+          <a:lnRef idx="1">
+            <a:schemeClr val="accent1"/>
+          </a:lnRef>
+          <a:fillRef idx="0">
+            <a:schemeClr val="accent1"/>
+          </a:fillRef>
+          <a:effectRef idx="0">
+            <a:schemeClr val="accent1"/>
+          </a:effectRef>
+          <a:fontRef idx="minor">
+            <a:schemeClr val="tx1"/>
+          </a:fontRef>
+        </p:style>
+      </p:cxnSp>
+      <p:cxnSp>
+        <p:nvCxnSpPr>
+          <p:cNvPr id="30" name="Straight Arrow Connector 29">
+            <a:extLst>
+              <a:ext uri="{FF2B5EF4-FFF2-40B4-BE49-F238E27FC236}">
+                <a16:creationId xmlns:a16="http://schemas.microsoft.com/office/drawing/2014/main" id="{891A7507-3194-45A3-AF99-D8C60581F822}"/>
+              </a:ext>
+            </a:extLst>
+          </p:cNvPr>
+          <p:cNvCxnSpPr>
+            <a:cxnSpLocks/>
+          </p:cNvCxnSpPr>
+          <p:nvPr/>
+        </p:nvCxnSpPr>
+        <p:spPr>
+          <a:xfrm>
+            <a:off x="4760959" y="2157162"/>
+            <a:ext cx="335425" cy="0"/>
+          </a:xfrm>
+          <a:prstGeom prst="straightConnector1">
+            <a:avLst/>
+          </a:prstGeom>
+          <a:ln w="200025">
+            <a:solidFill>
+              <a:srgbClr val="3BB752"/>
+            </a:solidFill>
+            <a:headEnd type="none" w="med" len="med"/>
+            <a:tailEnd type="none" w="med" len="med"/>
+          </a:ln>
+        </p:spPr>
+        <p:style>
+          <a:lnRef idx="1">
+            <a:schemeClr val="accent1"/>
+          </a:lnRef>
+          <a:fillRef idx="0">
+            <a:schemeClr val="accent1"/>
+          </a:fillRef>
+          <a:effectRef idx="0">
+            <a:schemeClr val="accent1"/>
+          </a:effectRef>
+          <a:fontRef idx="minor">
+            <a:schemeClr val="tx1"/>
+          </a:fontRef>
+        </p:style>
+      </p:cxnSp>
+      <p:cxnSp>
+        <p:nvCxnSpPr>
+          <p:cNvPr id="31" name="Straight Arrow Connector 30">
+            <a:extLst>
+              <a:ext uri="{FF2B5EF4-FFF2-40B4-BE49-F238E27FC236}">
+                <a16:creationId xmlns:a16="http://schemas.microsoft.com/office/drawing/2014/main" id="{6269EC34-DEAA-41A6-97D9-C156F3E0261E}"/>
+              </a:ext>
+            </a:extLst>
+          </p:cNvPr>
+          <p:cNvCxnSpPr>
+            <a:cxnSpLocks/>
+          </p:cNvCxnSpPr>
+          <p:nvPr/>
+        </p:nvCxnSpPr>
+        <p:spPr>
+          <a:xfrm>
+            <a:off x="4760958" y="2543094"/>
+            <a:ext cx="335425" cy="0"/>
+          </a:xfrm>
+          <a:prstGeom prst="straightConnector1">
+            <a:avLst/>
+          </a:prstGeom>
+          <a:ln w="200025">
+            <a:solidFill>
+              <a:srgbClr val="3BB752"/>
+            </a:solidFill>
+            <a:headEnd type="none" w="med" len="med"/>
+            <a:tailEnd type="none" w="med" len="med"/>
+          </a:ln>
+        </p:spPr>
+        <p:style>
+          <a:lnRef idx="1">
+            <a:schemeClr val="accent1"/>
+          </a:lnRef>
+          <a:fillRef idx="0">
+            <a:schemeClr val="accent1"/>
+          </a:fillRef>
+          <a:effectRef idx="0">
+            <a:schemeClr val="accent1"/>
+          </a:effectRef>
+          <a:fontRef idx="minor">
+            <a:schemeClr val="tx1"/>
+          </a:fontRef>
+        </p:style>
+      </p:cxnSp>
+      <p:cxnSp>
+        <p:nvCxnSpPr>
+          <p:cNvPr id="32" name="Straight Arrow Connector 31">
+            <a:extLst>
+              <a:ext uri="{FF2B5EF4-FFF2-40B4-BE49-F238E27FC236}">
+                <a16:creationId xmlns:a16="http://schemas.microsoft.com/office/drawing/2014/main" id="{DF5474E6-AF58-4F97-A8D2-80C130385656}"/>
+              </a:ext>
+            </a:extLst>
+          </p:cNvPr>
+          <p:cNvCxnSpPr>
+            <a:cxnSpLocks/>
+          </p:cNvCxnSpPr>
+          <p:nvPr/>
+        </p:nvCxnSpPr>
+        <p:spPr>
+          <a:xfrm flipV="1">
+            <a:off x="4935719" y="2215779"/>
+            <a:ext cx="0" cy="308096"/>
+          </a:xfrm>
+          <a:prstGeom prst="straightConnector1">
+            <a:avLst/>
+          </a:prstGeom>
+          <a:ln w="76200">
+            <a:solidFill>
+              <a:srgbClr val="3BB752"/>
+            </a:solidFill>
+            <a:headEnd type="none" w="med" len="med"/>
+            <a:tailEnd type="none" w="med" len="med"/>
+          </a:ln>
+        </p:spPr>
+        <p:style>
+          <a:lnRef idx="1">
+            <a:schemeClr val="accent1"/>
+          </a:lnRef>
+          <a:fillRef idx="0">
+            <a:schemeClr val="accent1"/>
+          </a:fillRef>
+          <a:effectRef idx="0">
+            <a:schemeClr val="accent1"/>
+          </a:effectRef>
+          <a:fontRef idx="minor">
+            <a:schemeClr val="tx1"/>
+          </a:fontRef>
+        </p:style>
+      </p:cxnSp>
+      <p:cxnSp>
+        <p:nvCxnSpPr>
+          <p:cNvPr id="35" name="Straight Arrow Connector 34">
+            <a:extLst>
+              <a:ext uri="{FF2B5EF4-FFF2-40B4-BE49-F238E27FC236}">
+                <a16:creationId xmlns:a16="http://schemas.microsoft.com/office/drawing/2014/main" id="{C531EB04-9FB8-435F-88BD-C78EE6F4A0FD}"/>
+              </a:ext>
+            </a:extLst>
+          </p:cNvPr>
+          <p:cNvCxnSpPr>
+            <a:cxnSpLocks/>
+          </p:cNvCxnSpPr>
+          <p:nvPr/>
+        </p:nvCxnSpPr>
+        <p:spPr>
+          <a:xfrm>
+            <a:off x="3993203" y="1917329"/>
+            <a:ext cx="564179" cy="325768"/>
+          </a:xfrm>
+          <a:prstGeom prst="straightConnector1">
+            <a:avLst/>
+          </a:prstGeom>
+          <a:ln w="53975">
+            <a:solidFill>
+              <a:srgbClr val="3BB752"/>
+            </a:solidFill>
+            <a:headEnd type="none" w="med" len="med"/>
+            <a:tailEnd type="triangle" w="med" len="med"/>
+          </a:ln>
+        </p:spPr>
+        <p:style>
+          <a:lnRef idx="1">
+            <a:schemeClr val="accent1"/>
+          </a:lnRef>
+          <a:fillRef idx="0">
+            <a:schemeClr val="accent1"/>
+          </a:fillRef>
+          <a:effectRef idx="0">
+            <a:schemeClr val="accent1"/>
+          </a:effectRef>
+          <a:fontRef idx="minor">
+            <a:schemeClr val="tx1"/>
+          </a:fontRef>
+        </p:style>
+      </p:cxnSp>
+      <p:cxnSp>
+        <p:nvCxnSpPr>
+          <p:cNvPr id="36" name="Straight Arrow Connector 35">
+            <a:extLst>
+              <a:ext uri="{FF2B5EF4-FFF2-40B4-BE49-F238E27FC236}">
+                <a16:creationId xmlns:a16="http://schemas.microsoft.com/office/drawing/2014/main" id="{44FF2873-EB9A-4CCA-A3A0-BC18D3795FB5}"/>
+              </a:ext>
+            </a:extLst>
+          </p:cNvPr>
+          <p:cNvCxnSpPr>
+            <a:cxnSpLocks/>
+          </p:cNvCxnSpPr>
+          <p:nvPr/>
+        </p:nvCxnSpPr>
+        <p:spPr>
+          <a:xfrm>
+            <a:off x="4090544" y="1656056"/>
+            <a:ext cx="580516" cy="0"/>
+          </a:xfrm>
+          <a:prstGeom prst="straightConnector1">
+            <a:avLst/>
+          </a:prstGeom>
+          <a:ln w="53975">
+            <a:solidFill>
+              <a:srgbClr val="3BB752"/>
+            </a:solidFill>
+            <a:headEnd type="none" w="med" len="med"/>
+            <a:tailEnd type="triangle" w="med" len="med"/>
+          </a:ln>
+        </p:spPr>
+        <p:style>
+          <a:lnRef idx="1">
+            <a:schemeClr val="accent1"/>
+          </a:lnRef>
+          <a:fillRef idx="0">
+            <a:schemeClr val="accent1"/>
+          </a:fillRef>
+          <a:effectRef idx="0">
+            <a:schemeClr val="accent1"/>
+          </a:effectRef>
+          <a:fontRef idx="minor">
+            <a:schemeClr val="tx1"/>
+          </a:fontRef>
+        </p:style>
+      </p:cxnSp>
+      <p:cxnSp>
+        <p:nvCxnSpPr>
+          <p:cNvPr id="38" name="Straight Arrow Connector 37">
+            <a:extLst>
+              <a:ext uri="{FF2B5EF4-FFF2-40B4-BE49-F238E27FC236}">
+                <a16:creationId xmlns:a16="http://schemas.microsoft.com/office/drawing/2014/main" id="{163F5F8D-9F6C-4F5D-899F-36ED1DFE0C53}"/>
+              </a:ext>
+            </a:extLst>
+          </p:cNvPr>
+          <p:cNvCxnSpPr>
+            <a:cxnSpLocks/>
+          </p:cNvCxnSpPr>
+          <p:nvPr/>
+        </p:nvCxnSpPr>
+        <p:spPr>
+          <a:xfrm flipV="1">
+            <a:off x="4013064" y="1017534"/>
+            <a:ext cx="544318" cy="357352"/>
+          </a:xfrm>
+          <a:prstGeom prst="straightConnector1">
+            <a:avLst/>
+          </a:prstGeom>
+          <a:ln w="53975">
+            <a:solidFill>
+              <a:srgbClr val="3BB752"/>
+            </a:solidFill>
+            <a:headEnd type="none" w="med" len="med"/>
+            <a:tailEnd type="triangle" w="med" len="med"/>
+          </a:ln>
+        </p:spPr>
+        <p:style>
+          <a:lnRef idx="1">
+            <a:schemeClr val="accent1"/>
+          </a:lnRef>
+          <a:fillRef idx="0">
+            <a:schemeClr val="accent1"/>
+          </a:fillRef>
+          <a:effectRef idx="0">
+            <a:schemeClr val="accent1"/>
+          </a:effectRef>
+          <a:fontRef idx="minor">
+            <a:schemeClr val="tx1"/>
+          </a:fontRef>
+        </p:style>
+      </p:cxnSp>
+      <p:sp>
+        <p:nvSpPr>
+          <p:cNvPr id="41" name="TextBox 40">
+            <a:extLst>
+              <a:ext uri="{FF2B5EF4-FFF2-40B4-BE49-F238E27FC236}">
+                <a16:creationId xmlns:a16="http://schemas.microsoft.com/office/drawing/2014/main" id="{48891D7B-9F67-495C-95B6-B0E2BEDC78F1}"/>
+              </a:ext>
+            </a:extLst>
+          </p:cNvPr>
+          <p:cNvSpPr txBox="1"/>
+          <p:nvPr/>
+        </p:nvSpPr>
+        <p:spPr>
+          <a:xfrm>
+            <a:off x="3985261" y="491946"/>
+            <a:ext cx="685799" cy="769441"/>
+          </a:xfrm>
+          <a:prstGeom prst="rect">
+            <a:avLst/>
+          </a:prstGeom>
+          <a:ln w="76200">
+            <a:noFill/>
+            <a:headEnd type="none" w="med" len="med"/>
+            <a:tailEnd type="none" w="med" len="med"/>
+          </a:ln>
+        </p:spPr>
+        <p:style>
+          <a:lnRef idx="1">
+            <a:schemeClr val="accent1"/>
+          </a:lnRef>
+          <a:fillRef idx="0">
+            <a:schemeClr val="accent1"/>
+          </a:fillRef>
+          <a:effectRef idx="0">
+            <a:schemeClr val="accent1"/>
+          </a:effectRef>
+          <a:fontRef idx="minor">
+            <a:schemeClr val="tx1"/>
+          </a:fontRef>
+        </p:style>
+        <p:txBody>
+          <a:bodyPr wrap="square" rtlCol="0">
+            <a:spAutoFit/>
+          </a:bodyPr>
+          <a:lstStyle/>
+          <a:p>
+            <a:r>
+              <a:rPr lang="en-US" sz="4400" dirty="0">
+                <a:solidFill>
+                  <a:srgbClr val="3BB752"/>
+                </a:solidFill>
+                <a:latin typeface="Roboto" panose="02000000000000000000" pitchFamily="2" charset="0"/>
+                <a:ea typeface="Roboto" panose="02000000000000000000" pitchFamily="2" charset="0"/>
+              </a:rPr>
+              <a:t>?</a:t>
+            </a:r>
+          </a:p>
+        </p:txBody>
+      </p:sp>
+      <p:pic>
+        <p:nvPicPr>
+          <p:cNvPr id="47" name="Graphic 46" descr="Trophy with solid fill">
+            <a:extLst>
+              <a:ext uri="{FF2B5EF4-FFF2-40B4-BE49-F238E27FC236}">
+                <a16:creationId xmlns:a16="http://schemas.microsoft.com/office/drawing/2014/main" id="{3552A082-4BC9-4F7B-B0E7-9F7A923C3714}"/>
+              </a:ext>
+            </a:extLst>
+          </p:cNvPr>
+          <p:cNvPicPr>
+            <a:picLocks noChangeAspect="1"/>
+          </p:cNvPicPr>
+          <p:nvPr/>
+        </p:nvPicPr>
+        <p:blipFill>
+          <a:blip r:embed="rId2">
+            <a:extLst>
+              <a:ext uri="{28A0092B-C50C-407E-A947-70E740481C1C}">
+                <a14:useLocalDpi xmlns:a14="http://schemas.microsoft.com/office/drawing/2010/main" val="0"/>
+              </a:ext>
+              <a:ext uri="{96DAC541-7B7A-43D3-8B79-37D633B846F1}">
+                <asvg:svgBlip xmlns:asvg="http://schemas.microsoft.com/office/drawing/2016/SVG/main" r:embed="rId3"/>
+              </a:ext>
+            </a:extLst>
+          </a:blip>
+          <a:stretch>
+            <a:fillRect/>
+          </a:stretch>
+        </p:blipFill>
+        <p:spPr>
+          <a:xfrm>
+            <a:off x="1550630" y="579172"/>
+            <a:ext cx="442664" cy="442664"/>
+          </a:xfrm>
+          <a:prstGeom prst="rect">
+            <a:avLst/>
+          </a:prstGeom>
+        </p:spPr>
+      </p:pic>
+      <p:cxnSp>
+        <p:nvCxnSpPr>
+          <p:cNvPr id="48" name="Straight Arrow Connector 47">
+            <a:extLst>
+              <a:ext uri="{FF2B5EF4-FFF2-40B4-BE49-F238E27FC236}">
+                <a16:creationId xmlns:a16="http://schemas.microsoft.com/office/drawing/2014/main" id="{0204020D-D729-45F3-A4E5-358B72331783}"/>
+              </a:ext>
+            </a:extLst>
+          </p:cNvPr>
+          <p:cNvCxnSpPr>
+            <a:cxnSpLocks/>
+          </p:cNvCxnSpPr>
+          <p:nvPr/>
+        </p:nvCxnSpPr>
+        <p:spPr>
+          <a:xfrm>
+            <a:off x="6275987" y="1605502"/>
+            <a:ext cx="194836" cy="0"/>
+          </a:xfrm>
+          <a:prstGeom prst="straightConnector1">
+            <a:avLst/>
+          </a:prstGeom>
+          <a:ln w="28575">
+            <a:solidFill>
+              <a:srgbClr val="3BB752"/>
+            </a:solidFill>
+            <a:headEnd type="none" w="med" len="med"/>
+            <a:tailEnd type="none" w="med" len="med"/>
+          </a:ln>
+        </p:spPr>
+        <p:style>
+          <a:lnRef idx="1">
+            <a:schemeClr val="accent1"/>
+          </a:lnRef>
+          <a:fillRef idx="0">
+            <a:schemeClr val="accent1"/>
+          </a:fillRef>
+          <a:effectRef idx="0">
+            <a:schemeClr val="accent1"/>
+          </a:effectRef>
+          <a:fontRef idx="minor">
+            <a:schemeClr val="tx1"/>
+          </a:fontRef>
+        </p:style>
+      </p:cxnSp>
+      <p:cxnSp>
+        <p:nvCxnSpPr>
+          <p:cNvPr id="49" name="Straight Arrow Connector 48">
+            <a:extLst>
+              <a:ext uri="{FF2B5EF4-FFF2-40B4-BE49-F238E27FC236}">
+                <a16:creationId xmlns:a16="http://schemas.microsoft.com/office/drawing/2014/main" id="{281EBFB6-2201-4817-83D9-D7B9B7EA6E33}"/>
+              </a:ext>
+            </a:extLst>
+          </p:cNvPr>
+          <p:cNvCxnSpPr>
+            <a:cxnSpLocks/>
+          </p:cNvCxnSpPr>
+          <p:nvPr/>
+        </p:nvCxnSpPr>
+        <p:spPr>
+          <a:xfrm>
+            <a:off x="6275986" y="1769015"/>
+            <a:ext cx="194837" cy="0"/>
+          </a:xfrm>
+          <a:prstGeom prst="straightConnector1">
+            <a:avLst/>
+          </a:prstGeom>
+          <a:ln w="28575">
+            <a:solidFill>
+              <a:srgbClr val="3BB752"/>
+            </a:solidFill>
+            <a:headEnd type="none" w="med" len="med"/>
+            <a:tailEnd type="none" w="med" len="med"/>
+          </a:ln>
+        </p:spPr>
+        <p:style>
+          <a:lnRef idx="1">
+            <a:schemeClr val="accent1"/>
+          </a:lnRef>
+          <a:fillRef idx="0">
+            <a:schemeClr val="accent1"/>
+          </a:fillRef>
+          <a:effectRef idx="0">
+            <a:schemeClr val="accent1"/>
+          </a:effectRef>
+          <a:fontRef idx="minor">
+            <a:schemeClr val="tx1"/>
+          </a:fontRef>
+        </p:style>
+      </p:cxnSp>
+      <p:cxnSp>
+        <p:nvCxnSpPr>
+          <p:cNvPr id="50" name="Straight Arrow Connector 49">
+            <a:extLst>
+              <a:ext uri="{FF2B5EF4-FFF2-40B4-BE49-F238E27FC236}">
+                <a16:creationId xmlns:a16="http://schemas.microsoft.com/office/drawing/2014/main" id="{35A4396B-0FDD-42DE-80FA-76897E490E00}"/>
+              </a:ext>
+            </a:extLst>
+          </p:cNvPr>
+          <p:cNvCxnSpPr>
+            <a:cxnSpLocks/>
+          </p:cNvCxnSpPr>
+          <p:nvPr/>
+        </p:nvCxnSpPr>
+        <p:spPr>
+          <a:xfrm flipV="1">
+            <a:off x="6369783" y="1605502"/>
+            <a:ext cx="0" cy="163513"/>
+          </a:xfrm>
+          <a:prstGeom prst="straightConnector1">
+            <a:avLst/>
+          </a:prstGeom>
+          <a:ln w="28575">
+            <a:solidFill>
+              <a:srgbClr val="3BB752"/>
+            </a:solidFill>
+            <a:headEnd type="none" w="med" len="med"/>
+            <a:tailEnd type="none" w="med" len="med"/>
+          </a:ln>
+        </p:spPr>
+        <p:style>
+          <a:lnRef idx="1">
+            <a:schemeClr val="accent1"/>
+          </a:lnRef>
+          <a:fillRef idx="0">
+            <a:schemeClr val="accent1"/>
+          </a:fillRef>
+          <a:effectRef idx="0">
+            <a:schemeClr val="accent1"/>
+          </a:effectRef>
+          <a:fontRef idx="minor">
+            <a:schemeClr val="tx1"/>
+          </a:fontRef>
+        </p:style>
+      </p:cxnSp>
+      <p:sp>
+        <p:nvSpPr>
+          <p:cNvPr id="51" name="Oval 50">
+            <a:extLst>
+              <a:ext uri="{FF2B5EF4-FFF2-40B4-BE49-F238E27FC236}">
+                <a16:creationId xmlns:a16="http://schemas.microsoft.com/office/drawing/2014/main" id="{4F02E7FA-B9C8-41BE-B41C-3EB8C431CB63}"/>
+              </a:ext>
+            </a:extLst>
+          </p:cNvPr>
+          <p:cNvSpPr/>
+          <p:nvPr/>
+        </p:nvSpPr>
+        <p:spPr>
+          <a:xfrm>
+            <a:off x="6282833" y="1275498"/>
+            <a:ext cx="179541" cy="179541"/>
+          </a:xfrm>
+          <a:prstGeom prst="ellipse">
+            <a:avLst/>
+          </a:prstGeom>
+          <a:ln w="28575">
+            <a:solidFill>
+              <a:srgbClr val="3BB752"/>
+            </a:solidFill>
+            <a:headEnd type="none" w="med" len="med"/>
+            <a:tailEnd type="none" w="med" len="med"/>
+          </a:ln>
+        </p:spPr>
+        <p:style>
+          <a:lnRef idx="1">
+            <a:schemeClr val="accent1"/>
+          </a:lnRef>
+          <a:fillRef idx="0">
+            <a:schemeClr val="accent1"/>
+          </a:fillRef>
+          <a:effectRef idx="0">
+            <a:schemeClr val="accent1"/>
+          </a:effectRef>
+          <a:fontRef idx="minor">
+            <a:schemeClr val="tx1"/>
+          </a:fontRef>
+        </p:style>
+        <p:txBody>
+          <a:bodyPr rtlCol="0" anchor="ctr"/>
+          <a:lstStyle/>
+          <a:p>
+            <a:pPr algn="ctr"/>
+            <a:endParaRPr lang="en-US"/>
+          </a:p>
+        </p:txBody>
+      </p:sp>
+      <p:cxnSp>
+        <p:nvCxnSpPr>
+          <p:cNvPr id="52" name="Straight Arrow Connector 51">
+            <a:extLst>
+              <a:ext uri="{FF2B5EF4-FFF2-40B4-BE49-F238E27FC236}">
+                <a16:creationId xmlns:a16="http://schemas.microsoft.com/office/drawing/2014/main" id="{BB4F9B04-E8BA-48F3-91FE-176D883EC542}"/>
+              </a:ext>
+            </a:extLst>
+          </p:cNvPr>
+          <p:cNvCxnSpPr>
+            <a:cxnSpLocks/>
+          </p:cNvCxnSpPr>
+          <p:nvPr/>
+        </p:nvCxnSpPr>
+        <p:spPr>
+          <a:xfrm>
+            <a:off x="6275986" y="1955022"/>
+            <a:ext cx="194837" cy="0"/>
+          </a:xfrm>
+          <a:prstGeom prst="straightConnector1">
+            <a:avLst/>
+          </a:prstGeom>
+          <a:ln w="28575">
+            <a:solidFill>
+              <a:srgbClr val="3BB752"/>
+            </a:solidFill>
+            <a:headEnd type="none" w="med" len="med"/>
+            <a:tailEnd type="none" w="med" len="med"/>
+          </a:ln>
+        </p:spPr>
+        <p:style>
+          <a:lnRef idx="1">
+            <a:schemeClr val="accent1"/>
+          </a:lnRef>
+          <a:fillRef idx="0">
+            <a:schemeClr val="accent1"/>
+          </a:fillRef>
+          <a:effectRef idx="0">
+            <a:schemeClr val="accent1"/>
+          </a:effectRef>
+          <a:fontRef idx="minor">
+            <a:schemeClr val="tx1"/>
+          </a:fontRef>
+        </p:style>
+      </p:cxnSp>
+      <p:cxnSp>
+        <p:nvCxnSpPr>
+          <p:cNvPr id="53" name="Straight Arrow Connector 52">
+            <a:extLst>
+              <a:ext uri="{FF2B5EF4-FFF2-40B4-BE49-F238E27FC236}">
+                <a16:creationId xmlns:a16="http://schemas.microsoft.com/office/drawing/2014/main" id="{297E22CE-2701-497D-92FD-E70D0BDD4BD1}"/>
+              </a:ext>
+            </a:extLst>
+          </p:cNvPr>
+          <p:cNvCxnSpPr>
+            <a:cxnSpLocks/>
+          </p:cNvCxnSpPr>
+          <p:nvPr/>
+        </p:nvCxnSpPr>
+        <p:spPr>
+          <a:xfrm>
+            <a:off x="6288930" y="2121547"/>
+            <a:ext cx="181893" cy="0"/>
+          </a:xfrm>
+          <a:prstGeom prst="straightConnector1">
+            <a:avLst/>
+          </a:prstGeom>
+          <a:ln w="28575">
+            <a:solidFill>
+              <a:srgbClr val="3BB752"/>
+            </a:solidFill>
+            <a:headEnd type="none" w="med" len="med"/>
+            <a:tailEnd type="none" w="med" len="med"/>
+          </a:ln>
+        </p:spPr>
+        <p:style>
+          <a:lnRef idx="1">
+            <a:schemeClr val="accent1"/>
+          </a:lnRef>
+          <a:fillRef idx="0">
+            <a:schemeClr val="accent1"/>
+          </a:fillRef>
+          <a:effectRef idx="0">
+            <a:schemeClr val="accent1"/>
+          </a:effectRef>
+          <a:fontRef idx="minor">
+            <a:schemeClr val="tx1"/>
+          </a:fontRef>
+        </p:style>
+      </p:cxnSp>
+      <p:cxnSp>
+        <p:nvCxnSpPr>
+          <p:cNvPr id="54" name="Straight Arrow Connector 53">
+            <a:extLst>
+              <a:ext uri="{FF2B5EF4-FFF2-40B4-BE49-F238E27FC236}">
+                <a16:creationId xmlns:a16="http://schemas.microsoft.com/office/drawing/2014/main" id="{5ED4CE0B-CD9E-4213-BA5B-8A8F86B908F6}"/>
+              </a:ext>
+            </a:extLst>
+          </p:cNvPr>
+          <p:cNvCxnSpPr>
+            <a:cxnSpLocks/>
+          </p:cNvCxnSpPr>
+          <p:nvPr/>
+        </p:nvCxnSpPr>
+        <p:spPr>
+          <a:xfrm flipV="1">
+            <a:off x="6288930" y="1941006"/>
+            <a:ext cx="0" cy="193615"/>
+          </a:xfrm>
+          <a:prstGeom prst="straightConnector1">
+            <a:avLst/>
+          </a:prstGeom>
+          <a:ln w="28575">
+            <a:solidFill>
+              <a:srgbClr val="3BB752"/>
+            </a:solidFill>
+            <a:headEnd type="none" w="med" len="med"/>
+            <a:tailEnd type="none" w="med" len="med"/>
+          </a:ln>
+        </p:spPr>
+        <p:style>
+          <a:lnRef idx="1">
+            <a:schemeClr val="accent1"/>
+          </a:lnRef>
+          <a:fillRef idx="0">
+            <a:schemeClr val="accent1"/>
+          </a:fillRef>
+          <a:effectRef idx="0">
+            <a:schemeClr val="accent1"/>
+          </a:effectRef>
+          <a:fontRef idx="minor">
+            <a:schemeClr val="tx1"/>
+          </a:fontRef>
+        </p:style>
+      </p:cxnSp>
+      <p:sp>
+        <p:nvSpPr>
+          <p:cNvPr id="55" name="Oval 54">
+            <a:extLst>
+              <a:ext uri="{FF2B5EF4-FFF2-40B4-BE49-F238E27FC236}">
+                <a16:creationId xmlns:a16="http://schemas.microsoft.com/office/drawing/2014/main" id="{743E4A78-B836-4968-960C-A5A64FE33194}"/>
+              </a:ext>
+            </a:extLst>
+          </p:cNvPr>
+          <p:cNvSpPr/>
+          <p:nvPr/>
+        </p:nvSpPr>
+        <p:spPr>
+          <a:xfrm>
+            <a:off x="6284775" y="941697"/>
+            <a:ext cx="179539" cy="179539"/>
+          </a:xfrm>
+          <a:prstGeom prst="ellipse">
+            <a:avLst/>
+          </a:prstGeom>
+          <a:solidFill>
+            <a:srgbClr val="3BB752"/>
+          </a:solidFill>
+          <a:ln w="28575">
+            <a:solidFill>
+              <a:srgbClr val="3BB752"/>
+            </a:solidFill>
+            <a:headEnd type="none" w="med" len="med"/>
+            <a:tailEnd type="none" w="med" len="med"/>
+          </a:ln>
+        </p:spPr>
+        <p:style>
+          <a:lnRef idx="1">
+            <a:schemeClr val="accent1"/>
+          </a:lnRef>
+          <a:fillRef idx="0">
+            <a:schemeClr val="accent1"/>
+          </a:fillRef>
+          <a:effectRef idx="0">
+            <a:schemeClr val="accent1"/>
+          </a:effectRef>
+          <a:fontRef idx="minor">
+            <a:schemeClr val="tx1"/>
+          </a:fontRef>
+        </p:style>
+        <p:txBody>
+          <a:bodyPr rtlCol="0" anchor="ctr"/>
+          <a:lstStyle/>
+          <a:p>
+            <a:pPr algn="ctr"/>
+            <a:endParaRPr lang="en-US"/>
+          </a:p>
+        </p:txBody>
+      </p:sp>
+      <p:cxnSp>
+        <p:nvCxnSpPr>
+          <p:cNvPr id="57" name="Straight Connector 56">
+            <a:extLst>
+              <a:ext uri="{FF2B5EF4-FFF2-40B4-BE49-F238E27FC236}">
+                <a16:creationId xmlns:a16="http://schemas.microsoft.com/office/drawing/2014/main" id="{4379A465-43FD-495C-A1B9-CBAEF3E86BFD}"/>
+              </a:ext>
+            </a:extLst>
+          </p:cNvPr>
+          <p:cNvCxnSpPr>
+            <a:cxnSpLocks/>
+          </p:cNvCxnSpPr>
+          <p:nvPr/>
+        </p:nvCxnSpPr>
+        <p:spPr>
+          <a:xfrm>
+            <a:off x="6187440" y="861208"/>
+            <a:ext cx="0" cy="1571011"/>
+          </a:xfrm>
+          <a:prstGeom prst="line">
+            <a:avLst/>
+          </a:prstGeom>
+          <a:ln w="28575">
+            <a:solidFill>
+              <a:srgbClr val="3BB752"/>
+            </a:solidFill>
+            <a:headEnd type="none" w="med" len="med"/>
+            <a:tailEnd type="none" w="med" len="med"/>
+          </a:ln>
+        </p:spPr>
+        <p:style>
+          <a:lnRef idx="1">
+            <a:schemeClr val="accent1"/>
+          </a:lnRef>
+          <a:fillRef idx="0">
+            <a:schemeClr val="accent1"/>
+          </a:fillRef>
+          <a:effectRef idx="0">
+            <a:schemeClr val="accent1"/>
+          </a:effectRef>
+          <a:fontRef idx="minor">
+            <a:schemeClr val="tx1"/>
+          </a:fontRef>
+        </p:style>
+      </p:cxnSp>
+      <p:cxnSp>
+        <p:nvCxnSpPr>
+          <p:cNvPr id="58" name="Straight Connector 57">
+            <a:extLst>
+              <a:ext uri="{FF2B5EF4-FFF2-40B4-BE49-F238E27FC236}">
+                <a16:creationId xmlns:a16="http://schemas.microsoft.com/office/drawing/2014/main" id="{A6EA22C6-C9E1-49C3-A450-0737A593F145}"/>
+              </a:ext>
+            </a:extLst>
+          </p:cNvPr>
+          <p:cNvCxnSpPr>
+            <a:cxnSpLocks/>
+          </p:cNvCxnSpPr>
+          <p:nvPr/>
+        </p:nvCxnSpPr>
+        <p:spPr>
+          <a:xfrm>
+            <a:off x="6555740" y="528105"/>
+            <a:ext cx="1948180" cy="0"/>
+          </a:xfrm>
+          <a:prstGeom prst="line">
+            <a:avLst/>
+          </a:prstGeom>
+          <a:ln w="28575">
+            <a:solidFill>
+              <a:srgbClr val="3BB752"/>
+            </a:solidFill>
+            <a:headEnd type="none" w="med" len="med"/>
+            <a:tailEnd type="none" w="med" len="med"/>
+          </a:ln>
+        </p:spPr>
+        <p:style>
+          <a:lnRef idx="1">
+            <a:schemeClr val="accent1"/>
+          </a:lnRef>
+          <a:fillRef idx="0">
+            <a:schemeClr val="accent1"/>
+          </a:fillRef>
+          <a:effectRef idx="0">
+            <a:schemeClr val="accent1"/>
+          </a:effectRef>
+          <a:fontRef idx="minor">
+            <a:schemeClr val="tx1"/>
+          </a:fontRef>
+        </p:style>
+      </p:cxnSp>
+      <p:cxnSp>
+        <p:nvCxnSpPr>
+          <p:cNvPr id="60" name="Straight Connector 59">
+            <a:extLst>
+              <a:ext uri="{FF2B5EF4-FFF2-40B4-BE49-F238E27FC236}">
+                <a16:creationId xmlns:a16="http://schemas.microsoft.com/office/drawing/2014/main" id="{9F53FC0F-1E1F-4080-98E6-6BD449475CE5}"/>
+              </a:ext>
+            </a:extLst>
+          </p:cNvPr>
+          <p:cNvCxnSpPr>
+            <a:cxnSpLocks/>
+          </p:cNvCxnSpPr>
+          <p:nvPr/>
+        </p:nvCxnSpPr>
+        <p:spPr>
+          <a:xfrm>
+            <a:off x="6187440" y="1194311"/>
+            <a:ext cx="2316480" cy="0"/>
+          </a:xfrm>
+          <a:prstGeom prst="line">
+            <a:avLst/>
+          </a:prstGeom>
+          <a:ln w="28575">
+            <a:solidFill>
+              <a:srgbClr val="3BB752"/>
+            </a:solidFill>
+            <a:headEnd type="none" w="med" len="med"/>
+            <a:tailEnd type="none" w="med" len="med"/>
+          </a:ln>
+        </p:spPr>
+        <p:style>
+          <a:lnRef idx="1">
+            <a:schemeClr val="accent1"/>
+          </a:lnRef>
+          <a:fillRef idx="0">
+            <a:schemeClr val="accent1"/>
+          </a:fillRef>
+          <a:effectRef idx="0">
+            <a:schemeClr val="accent1"/>
+          </a:effectRef>
+          <a:fontRef idx="minor">
+            <a:schemeClr val="tx1"/>
+          </a:fontRef>
+        </p:style>
+      </p:cxnSp>
+      <p:cxnSp>
+        <p:nvCxnSpPr>
+          <p:cNvPr id="67" name="Straight Connector 66">
+            <a:extLst>
+              <a:ext uri="{FF2B5EF4-FFF2-40B4-BE49-F238E27FC236}">
+                <a16:creationId xmlns:a16="http://schemas.microsoft.com/office/drawing/2014/main" id="{0363C19D-96D9-4D86-9A64-A7A8E8F6A094}"/>
+              </a:ext>
+            </a:extLst>
+          </p:cNvPr>
+          <p:cNvCxnSpPr>
+            <a:cxnSpLocks/>
+          </p:cNvCxnSpPr>
+          <p:nvPr/>
+        </p:nvCxnSpPr>
+        <p:spPr>
+          <a:xfrm>
+            <a:off x="6187440" y="1527414"/>
+            <a:ext cx="2316480" cy="0"/>
+          </a:xfrm>
+          <a:prstGeom prst="line">
+            <a:avLst/>
+          </a:prstGeom>
+          <a:ln w="28575">
+            <a:solidFill>
+              <a:srgbClr val="3BB752"/>
+            </a:solidFill>
+            <a:headEnd type="none" w="med" len="med"/>
+            <a:tailEnd type="none" w="med" len="med"/>
+          </a:ln>
+        </p:spPr>
+        <p:style>
+          <a:lnRef idx="1">
+            <a:schemeClr val="accent1"/>
+          </a:lnRef>
+          <a:fillRef idx="0">
+            <a:schemeClr val="accent1"/>
+          </a:fillRef>
+          <a:effectRef idx="0">
+            <a:schemeClr val="accent1"/>
+          </a:effectRef>
+          <a:fontRef idx="minor">
+            <a:schemeClr val="tx1"/>
+          </a:fontRef>
+        </p:style>
+      </p:cxnSp>
+      <p:cxnSp>
+        <p:nvCxnSpPr>
+          <p:cNvPr id="68" name="Straight Connector 67">
+            <a:extLst>
+              <a:ext uri="{FF2B5EF4-FFF2-40B4-BE49-F238E27FC236}">
+                <a16:creationId xmlns:a16="http://schemas.microsoft.com/office/drawing/2014/main" id="{AB09C2FC-672F-4CF5-B839-795E30F5687A}"/>
+              </a:ext>
+            </a:extLst>
+          </p:cNvPr>
+          <p:cNvCxnSpPr>
+            <a:cxnSpLocks/>
+          </p:cNvCxnSpPr>
+          <p:nvPr/>
+        </p:nvCxnSpPr>
+        <p:spPr>
+          <a:xfrm>
+            <a:off x="6187440" y="1860517"/>
+            <a:ext cx="2316480" cy="0"/>
+          </a:xfrm>
+          <a:prstGeom prst="line">
+            <a:avLst/>
+          </a:prstGeom>
+          <a:ln w="28575">
+            <a:solidFill>
+              <a:srgbClr val="3BB752"/>
+            </a:solidFill>
+            <a:headEnd type="none" w="med" len="med"/>
+            <a:tailEnd type="none" w="med" len="med"/>
+          </a:ln>
+        </p:spPr>
+        <p:style>
+          <a:lnRef idx="1">
+            <a:schemeClr val="accent1"/>
+          </a:lnRef>
+          <a:fillRef idx="0">
+            <a:schemeClr val="accent1"/>
+          </a:fillRef>
+          <a:effectRef idx="0">
+            <a:schemeClr val="accent1"/>
+          </a:effectRef>
+          <a:fontRef idx="minor">
+            <a:schemeClr val="tx1"/>
+          </a:fontRef>
+        </p:style>
+      </p:cxnSp>
+      <p:cxnSp>
+        <p:nvCxnSpPr>
+          <p:cNvPr id="69" name="Straight Connector 68">
+            <a:extLst>
+              <a:ext uri="{FF2B5EF4-FFF2-40B4-BE49-F238E27FC236}">
+                <a16:creationId xmlns:a16="http://schemas.microsoft.com/office/drawing/2014/main" id="{C0D73302-13EA-414A-9B13-25763CE251FD}"/>
+              </a:ext>
+            </a:extLst>
+          </p:cNvPr>
+          <p:cNvCxnSpPr>
+            <a:cxnSpLocks/>
+          </p:cNvCxnSpPr>
+          <p:nvPr/>
+        </p:nvCxnSpPr>
+        <p:spPr>
+          <a:xfrm>
+            <a:off x="6187440" y="2193620"/>
+            <a:ext cx="2316480" cy="0"/>
+          </a:xfrm>
+          <a:prstGeom prst="line">
+            <a:avLst/>
+          </a:prstGeom>
+          <a:ln w="28575">
+            <a:solidFill>
+              <a:srgbClr val="3BB752"/>
+            </a:solidFill>
+            <a:headEnd type="none" w="med" len="med"/>
+            <a:tailEnd type="none" w="med" len="med"/>
+          </a:ln>
+        </p:spPr>
+        <p:style>
+          <a:lnRef idx="1">
+            <a:schemeClr val="accent1"/>
+          </a:lnRef>
+          <a:fillRef idx="0">
+            <a:schemeClr val="accent1"/>
+          </a:fillRef>
+          <a:effectRef idx="0">
+            <a:schemeClr val="accent1"/>
+          </a:effectRef>
+          <a:fontRef idx="minor">
+            <a:schemeClr val="tx1"/>
+          </a:fontRef>
+        </p:style>
+      </p:cxnSp>
+      <p:cxnSp>
+        <p:nvCxnSpPr>
+          <p:cNvPr id="70" name="Straight Connector 69">
+            <a:extLst>
+              <a:ext uri="{FF2B5EF4-FFF2-40B4-BE49-F238E27FC236}">
+                <a16:creationId xmlns:a16="http://schemas.microsoft.com/office/drawing/2014/main" id="{5CBC8FE4-83B4-4501-A2C0-135EACBE82D2}"/>
+              </a:ext>
+            </a:extLst>
+          </p:cNvPr>
+          <p:cNvCxnSpPr>
+            <a:cxnSpLocks/>
+          </p:cNvCxnSpPr>
+          <p:nvPr/>
+        </p:nvCxnSpPr>
+        <p:spPr>
+          <a:xfrm>
+            <a:off x="6187440" y="861208"/>
+            <a:ext cx="2316480" cy="0"/>
+          </a:xfrm>
+          <a:prstGeom prst="line">
+            <a:avLst/>
+          </a:prstGeom>
+          <a:ln w="28575">
+            <a:solidFill>
+              <a:srgbClr val="3BB752"/>
+            </a:solidFill>
+            <a:headEnd type="none" w="med" len="med"/>
+            <a:tailEnd type="none" w="med" len="med"/>
+          </a:ln>
+        </p:spPr>
+        <p:style>
+          <a:lnRef idx="1">
+            <a:schemeClr val="accent1"/>
+          </a:lnRef>
+          <a:fillRef idx="0">
+            <a:schemeClr val="accent1"/>
+          </a:fillRef>
+          <a:effectRef idx="0">
+            <a:schemeClr val="accent1"/>
+          </a:effectRef>
+          <a:fontRef idx="minor">
+            <a:schemeClr val="tx1"/>
+          </a:fontRef>
+        </p:style>
+      </p:cxnSp>
+      <p:cxnSp>
+        <p:nvCxnSpPr>
+          <p:cNvPr id="72" name="Straight Connector 71">
+            <a:extLst>
+              <a:ext uri="{FF2B5EF4-FFF2-40B4-BE49-F238E27FC236}">
+                <a16:creationId xmlns:a16="http://schemas.microsoft.com/office/drawing/2014/main" id="{D6003324-FDC2-4443-9B59-01F1F884FC5F}"/>
+              </a:ext>
+            </a:extLst>
+          </p:cNvPr>
+          <p:cNvCxnSpPr>
+            <a:cxnSpLocks/>
+          </p:cNvCxnSpPr>
+          <p:nvPr/>
+        </p:nvCxnSpPr>
+        <p:spPr>
+          <a:xfrm>
+            <a:off x="6555740" y="528105"/>
+            <a:ext cx="0" cy="1904114"/>
+          </a:xfrm>
+          <a:prstGeom prst="line">
+            <a:avLst/>
+          </a:prstGeom>
+          <a:ln w="28575">
+            <a:solidFill>
+              <a:srgbClr val="3BB752"/>
+            </a:solidFill>
+            <a:headEnd type="none" w="med" len="med"/>
+            <a:tailEnd type="none" w="med" len="med"/>
+          </a:ln>
+        </p:spPr>
+        <p:style>
+          <a:lnRef idx="1">
+            <a:schemeClr val="accent1"/>
+          </a:lnRef>
+          <a:fillRef idx="0">
+            <a:schemeClr val="accent1"/>
+          </a:fillRef>
+          <a:effectRef idx="0">
+            <a:schemeClr val="accent1"/>
+          </a:effectRef>
+          <a:fontRef idx="minor">
+            <a:schemeClr val="tx1"/>
+          </a:fontRef>
+        </p:style>
+      </p:cxnSp>
+      <p:cxnSp>
+        <p:nvCxnSpPr>
+          <p:cNvPr id="73" name="Straight Connector 72">
+            <a:extLst>
+              <a:ext uri="{FF2B5EF4-FFF2-40B4-BE49-F238E27FC236}">
+                <a16:creationId xmlns:a16="http://schemas.microsoft.com/office/drawing/2014/main" id="{E8479300-B4FB-4D9D-A418-0458E675CFD2}"/>
+              </a:ext>
+            </a:extLst>
+          </p:cNvPr>
+          <p:cNvCxnSpPr>
+            <a:cxnSpLocks/>
+          </p:cNvCxnSpPr>
+          <p:nvPr/>
+        </p:nvCxnSpPr>
+        <p:spPr>
+          <a:xfrm>
+            <a:off x="8079740" y="528105"/>
+            <a:ext cx="0" cy="1896380"/>
+          </a:xfrm>
+          <a:prstGeom prst="line">
+            <a:avLst/>
+          </a:prstGeom>
+          <a:ln w="28575">
+            <a:solidFill>
+              <a:srgbClr val="3BB752"/>
+            </a:solidFill>
+            <a:headEnd type="none" w="med" len="med"/>
+            <a:tailEnd type="none" w="med" len="med"/>
+          </a:ln>
+        </p:spPr>
+        <p:style>
+          <a:lnRef idx="1">
+            <a:schemeClr val="accent1"/>
+          </a:lnRef>
+          <a:fillRef idx="0">
+            <a:schemeClr val="accent1"/>
+          </a:fillRef>
+          <a:effectRef idx="0">
+            <a:schemeClr val="accent1"/>
+          </a:effectRef>
+          <a:fontRef idx="minor">
+            <a:schemeClr val="tx1"/>
+          </a:fontRef>
+        </p:style>
+      </p:cxnSp>
+      <p:cxnSp>
+        <p:nvCxnSpPr>
+          <p:cNvPr id="74" name="Straight Connector 73">
+            <a:extLst>
+              <a:ext uri="{FF2B5EF4-FFF2-40B4-BE49-F238E27FC236}">
+                <a16:creationId xmlns:a16="http://schemas.microsoft.com/office/drawing/2014/main" id="{BA2AE1EF-7A14-410B-B4D0-5153255ACF70}"/>
+              </a:ext>
+            </a:extLst>
+          </p:cNvPr>
+          <p:cNvCxnSpPr>
+            <a:cxnSpLocks/>
+          </p:cNvCxnSpPr>
+          <p:nvPr/>
+        </p:nvCxnSpPr>
+        <p:spPr>
+          <a:xfrm>
+            <a:off x="7266940" y="528105"/>
+            <a:ext cx="0" cy="1896380"/>
+          </a:xfrm>
+          <a:prstGeom prst="line">
+            <a:avLst/>
+          </a:prstGeom>
+          <a:ln w="28575">
+            <a:solidFill>
+              <a:srgbClr val="3BB752"/>
+            </a:solidFill>
+            <a:headEnd type="none" w="med" len="med"/>
+            <a:tailEnd type="none" w="med" len="med"/>
+          </a:ln>
+        </p:spPr>
+        <p:style>
+          <a:lnRef idx="1">
+            <a:schemeClr val="accent1"/>
+          </a:lnRef>
+          <a:fillRef idx="0">
+            <a:schemeClr val="accent1"/>
+          </a:fillRef>
+          <a:effectRef idx="0">
+            <a:schemeClr val="accent1"/>
+          </a:effectRef>
+          <a:fontRef idx="minor">
+            <a:schemeClr val="tx1"/>
+          </a:fontRef>
+        </p:style>
+      </p:cxnSp>
+      <p:sp>
+        <p:nvSpPr>
+          <p:cNvPr id="79" name="TextBox 78">
+            <a:extLst>
+              <a:ext uri="{FF2B5EF4-FFF2-40B4-BE49-F238E27FC236}">
+                <a16:creationId xmlns:a16="http://schemas.microsoft.com/office/drawing/2014/main" id="{8C4A9E66-7058-4CCD-B5EF-9BEE90350C1A}"/>
+              </a:ext>
+            </a:extLst>
+          </p:cNvPr>
+          <p:cNvSpPr txBox="1"/>
+          <p:nvPr/>
+        </p:nvSpPr>
+        <p:spPr>
+          <a:xfrm>
+            <a:off x="6575108" y="551751"/>
+            <a:ext cx="705340" cy="307777"/>
+          </a:xfrm>
+          <a:prstGeom prst="rect">
+            <a:avLst/>
+          </a:prstGeom>
+          <a:ln w="76200">
+            <a:noFill/>
+            <a:headEnd type="none" w="med" len="med"/>
+            <a:tailEnd type="none" w="med" len="med"/>
+          </a:ln>
+        </p:spPr>
+        <p:style>
+          <a:lnRef idx="1">
+            <a:schemeClr val="accent1"/>
+          </a:lnRef>
+          <a:fillRef idx="0">
+            <a:schemeClr val="accent1"/>
+          </a:fillRef>
+          <a:effectRef idx="0">
+            <a:schemeClr val="accent1"/>
+          </a:effectRef>
+          <a:fontRef idx="minor">
+            <a:schemeClr val="tx1"/>
+          </a:fontRef>
+        </p:style>
+        <p:txBody>
+          <a:bodyPr wrap="square" rtlCol="0">
+            <a:spAutoFit/>
+          </a:bodyPr>
+          <a:lstStyle>
+            <a:defPPr>
+              <a:defRPr lang="en-US"/>
+            </a:defPPr>
+            <a:lvl1pPr>
+              <a:defRPr sz="4400">
+                <a:solidFill>
+                  <a:srgbClr val="3BB752"/>
+                </a:solidFill>
+                <a:latin typeface="Roboto" panose="02000000000000000000" pitchFamily="2" charset="0"/>
+                <a:ea typeface="Roboto" panose="02000000000000000000" pitchFamily="2" charset="0"/>
+              </a:defRPr>
+            </a:lvl1pPr>
+          </a:lstStyle>
+          <a:p>
+            <a:pPr algn="ctr"/>
+            <a:r>
+              <a:rPr lang="en-US" sz="1400"/>
+              <a:t>Area</a:t>
+            </a:r>
+            <a:endParaRPr lang="en-US" sz="1400" dirty="0"/>
+          </a:p>
+        </p:txBody>
+      </p:sp>
+      <p:sp>
+        <p:nvSpPr>
+          <p:cNvPr id="80" name="TextBox 79">
+            <a:extLst>
+              <a:ext uri="{FF2B5EF4-FFF2-40B4-BE49-F238E27FC236}">
+                <a16:creationId xmlns:a16="http://schemas.microsoft.com/office/drawing/2014/main" id="{B5028101-EEDC-4E0A-8C0D-C6E7C2A72444}"/>
+              </a:ext>
+            </a:extLst>
+          </p:cNvPr>
+          <p:cNvSpPr txBox="1"/>
+          <p:nvPr/>
+        </p:nvSpPr>
+        <p:spPr>
+          <a:xfrm>
+            <a:off x="7250748" y="550058"/>
+            <a:ext cx="809625" cy="307777"/>
+          </a:xfrm>
+          <a:prstGeom prst="rect">
+            <a:avLst/>
+          </a:prstGeom>
+          <a:ln w="76200">
+            <a:noFill/>
+            <a:headEnd type="none" w="med" len="med"/>
+            <a:tailEnd type="none" w="med" len="med"/>
+          </a:ln>
+        </p:spPr>
+        <p:style>
+          <a:lnRef idx="1">
+            <a:schemeClr val="accent1"/>
+          </a:lnRef>
+          <a:fillRef idx="0">
+            <a:schemeClr val="accent1"/>
+          </a:fillRef>
+          <a:effectRef idx="0">
+            <a:schemeClr val="accent1"/>
+          </a:effectRef>
+          <a:fontRef idx="minor">
+            <a:schemeClr val="tx1"/>
+          </a:fontRef>
+        </p:style>
+        <p:txBody>
+          <a:bodyPr wrap="square" rtlCol="0">
+            <a:spAutoFit/>
+          </a:bodyPr>
+          <a:lstStyle>
+            <a:defPPr>
+              <a:defRPr lang="en-US"/>
+            </a:defPPr>
+            <a:lvl1pPr>
+              <a:defRPr sz="4400">
+                <a:solidFill>
+                  <a:srgbClr val="3BB752"/>
+                </a:solidFill>
+                <a:latin typeface="Roboto" panose="02000000000000000000" pitchFamily="2" charset="0"/>
+                <a:ea typeface="Roboto" panose="02000000000000000000" pitchFamily="2" charset="0"/>
+              </a:defRPr>
+            </a:lvl1pPr>
+          </a:lstStyle>
+          <a:p>
+            <a:pPr algn="ctr"/>
+            <a:r>
+              <a:rPr lang="en-US" sz="1400" dirty="0"/>
+              <a:t>Inertia</a:t>
+            </a:r>
+          </a:p>
+        </p:txBody>
+      </p:sp>
+      <p:sp>
+        <p:nvSpPr>
+          <p:cNvPr id="81" name="TextBox 80">
+            <a:extLst>
+              <a:ext uri="{FF2B5EF4-FFF2-40B4-BE49-F238E27FC236}">
+                <a16:creationId xmlns:a16="http://schemas.microsoft.com/office/drawing/2014/main" id="{D6C1051D-CF56-4547-AFD1-F4432D227765}"/>
+              </a:ext>
+            </a:extLst>
+          </p:cNvPr>
+          <p:cNvSpPr txBox="1"/>
+          <p:nvPr/>
+        </p:nvSpPr>
+        <p:spPr>
+          <a:xfrm>
+            <a:off x="8038525" y="1057141"/>
+            <a:ext cx="698513" cy="461665"/>
+          </a:xfrm>
+          <a:prstGeom prst="rect">
+            <a:avLst/>
+          </a:prstGeom>
+          <a:ln w="76200">
+            <a:noFill/>
+            <a:headEnd type="none" w="med" len="med"/>
+            <a:tailEnd type="none" w="med" len="med"/>
+          </a:ln>
+        </p:spPr>
+        <p:style>
+          <a:lnRef idx="1">
+            <a:schemeClr val="accent1"/>
+          </a:lnRef>
+          <a:fillRef idx="0">
+            <a:schemeClr val="accent1"/>
+          </a:fillRef>
+          <a:effectRef idx="0">
+            <a:schemeClr val="accent1"/>
+          </a:effectRef>
+          <a:fontRef idx="minor">
+            <a:schemeClr val="tx1"/>
+          </a:fontRef>
+        </p:style>
+        <p:txBody>
+          <a:bodyPr wrap="square" rtlCol="0">
+            <a:spAutoFit/>
+          </a:bodyPr>
+          <a:lstStyle>
+            <a:defPPr>
+              <a:defRPr lang="en-US"/>
+            </a:defPPr>
+            <a:lvl1pPr>
+              <a:defRPr sz="4400">
+                <a:solidFill>
+                  <a:srgbClr val="3BB752"/>
+                </a:solidFill>
+                <a:latin typeface="Roboto" panose="02000000000000000000" pitchFamily="2" charset="0"/>
+                <a:ea typeface="Roboto" panose="02000000000000000000" pitchFamily="2" charset="0"/>
+              </a:defRPr>
+            </a:lvl1pPr>
+          </a:lstStyle>
+          <a:p>
+            <a:pPr algn="ctr"/>
+            <a:r>
+              <a:rPr lang="en-US" sz="2400" dirty="0"/>
+              <a:t>. . .</a:t>
+            </a:r>
+          </a:p>
+        </p:txBody>
+      </p:sp>
+      <p:sp>
+        <p:nvSpPr>
+          <p:cNvPr id="82" name="TextBox 81">
+            <a:extLst>
+              <a:ext uri="{FF2B5EF4-FFF2-40B4-BE49-F238E27FC236}">
+                <a16:creationId xmlns:a16="http://schemas.microsoft.com/office/drawing/2014/main" id="{F6DF56A1-46CA-4D18-AAA9-8A00F4DB5F4B}"/>
+              </a:ext>
+            </a:extLst>
+          </p:cNvPr>
+          <p:cNvSpPr txBox="1"/>
+          <p:nvPr/>
+        </p:nvSpPr>
+        <p:spPr>
+          <a:xfrm>
+            <a:off x="6929240" y="2231866"/>
+            <a:ext cx="698513" cy="461665"/>
+          </a:xfrm>
+          <a:prstGeom prst="rect">
+            <a:avLst/>
+          </a:prstGeom>
+          <a:ln w="76200">
+            <a:noFill/>
+            <a:headEnd type="none" w="med" len="med"/>
+            <a:tailEnd type="none" w="med" len="med"/>
+          </a:ln>
+        </p:spPr>
+        <p:style>
+          <a:lnRef idx="1">
+            <a:schemeClr val="accent1"/>
+          </a:lnRef>
+          <a:fillRef idx="0">
+            <a:schemeClr val="accent1"/>
+          </a:fillRef>
+          <a:effectRef idx="0">
+            <a:schemeClr val="accent1"/>
+          </a:effectRef>
+          <a:fontRef idx="minor">
+            <a:schemeClr val="tx1"/>
+          </a:fontRef>
+        </p:style>
+        <p:txBody>
+          <a:bodyPr wrap="square" rtlCol="0">
+            <a:spAutoFit/>
+          </a:bodyPr>
+          <a:lstStyle>
+            <a:defPPr>
+              <a:defRPr lang="en-US"/>
+            </a:defPPr>
+            <a:lvl1pPr>
+              <a:defRPr sz="4400">
+                <a:solidFill>
+                  <a:srgbClr val="3BB752"/>
+                </a:solidFill>
+                <a:latin typeface="Roboto" panose="02000000000000000000" pitchFamily="2" charset="0"/>
+                <a:ea typeface="Roboto" panose="02000000000000000000" pitchFamily="2" charset="0"/>
+              </a:defRPr>
+            </a:lvl1pPr>
+          </a:lstStyle>
+          <a:p>
+            <a:pPr algn="ctr"/>
+            <a:r>
+              <a:rPr lang="en-US" sz="2400" dirty="0"/>
+              <a:t>. . .</a:t>
+            </a:r>
+          </a:p>
+        </p:txBody>
+      </p:sp>
+      <p:sp>
+        <p:nvSpPr>
+          <p:cNvPr id="84" name="Rectangle 83">
+            <a:extLst>
+              <a:ext uri="{FF2B5EF4-FFF2-40B4-BE49-F238E27FC236}">
+                <a16:creationId xmlns:a16="http://schemas.microsoft.com/office/drawing/2014/main" id="{20ACC927-6FAE-4BE5-8AF8-1DC0C3317C2F}"/>
+              </a:ext>
+            </a:extLst>
+          </p:cNvPr>
+          <p:cNvSpPr/>
+          <p:nvPr/>
+        </p:nvSpPr>
+        <p:spPr>
+          <a:xfrm>
+            <a:off x="498852" y="328968"/>
+            <a:ext cx="2553068" cy="2553068"/>
+          </a:xfrm>
+          <a:prstGeom prst="rect">
+            <a:avLst/>
+          </a:prstGeom>
+          <a:noFill/>
+          <a:ln>
+            <a:solidFill>
+              <a:srgbClr val="3BB752"/>
+            </a:solidFill>
+          </a:ln>
+        </p:spPr>
+        <p:style>
+          <a:lnRef idx="2">
+            <a:schemeClr val="accent1">
+              <a:shade val="50000"/>
+            </a:schemeClr>
+          </a:lnRef>
+          <a:fillRef idx="1">
+            <a:schemeClr val="accent1"/>
+          </a:fillRef>
+          <a:effectRef idx="0">
+            <a:schemeClr val="accent1"/>
+          </a:effectRef>
+          <a:fontRef idx="minor">
+            <a:schemeClr val="lt1"/>
+          </a:fontRef>
+        </p:style>
+        <p:txBody>
+          <a:bodyPr rtlCol="0" anchor="ctr"/>
+          <a:lstStyle/>
+          <a:p>
+            <a:pPr algn="ctr"/>
+            <a:endParaRPr lang="en-US"/>
+          </a:p>
+        </p:txBody>
+      </p:sp>
+      <p:sp>
+        <p:nvSpPr>
+          <p:cNvPr id="85" name="Rectangle 84">
+            <a:extLst>
+              <a:ext uri="{FF2B5EF4-FFF2-40B4-BE49-F238E27FC236}">
+                <a16:creationId xmlns:a16="http://schemas.microsoft.com/office/drawing/2014/main" id="{8999D4F1-89A8-4295-92B9-3FBA274EA687}"/>
+              </a:ext>
+            </a:extLst>
+          </p:cNvPr>
+          <p:cNvSpPr/>
+          <p:nvPr/>
+        </p:nvSpPr>
+        <p:spPr>
+          <a:xfrm>
+            <a:off x="3260873" y="328968"/>
+            <a:ext cx="2553068" cy="2553068"/>
+          </a:xfrm>
+          <a:prstGeom prst="rect">
+            <a:avLst/>
+          </a:prstGeom>
+          <a:noFill/>
+          <a:ln>
+            <a:solidFill>
+              <a:srgbClr val="3BB752"/>
+            </a:solidFill>
+          </a:ln>
+        </p:spPr>
+        <p:style>
+          <a:lnRef idx="2">
+            <a:schemeClr val="accent1">
+              <a:shade val="50000"/>
+            </a:schemeClr>
+          </a:lnRef>
+          <a:fillRef idx="1">
+            <a:schemeClr val="accent1"/>
+          </a:fillRef>
+          <a:effectRef idx="0">
+            <a:schemeClr val="accent1"/>
+          </a:effectRef>
+          <a:fontRef idx="minor">
+            <a:schemeClr val="lt1"/>
+          </a:fontRef>
+        </p:style>
+        <p:txBody>
+          <a:bodyPr rtlCol="0" anchor="ctr"/>
+          <a:lstStyle/>
+          <a:p>
+            <a:pPr algn="ctr"/>
+            <a:endParaRPr lang="en-US"/>
+          </a:p>
+        </p:txBody>
+      </p:sp>
+      <p:sp>
+        <p:nvSpPr>
+          <p:cNvPr id="86" name="Rectangle 85">
+            <a:extLst>
+              <a:ext uri="{FF2B5EF4-FFF2-40B4-BE49-F238E27FC236}">
+                <a16:creationId xmlns:a16="http://schemas.microsoft.com/office/drawing/2014/main" id="{68A346A7-137F-4012-8899-89F4822BADAA}"/>
+              </a:ext>
+            </a:extLst>
+          </p:cNvPr>
+          <p:cNvSpPr/>
+          <p:nvPr/>
+        </p:nvSpPr>
+        <p:spPr>
+          <a:xfrm>
+            <a:off x="6092799" y="328968"/>
+            <a:ext cx="2553068" cy="2553068"/>
+          </a:xfrm>
+          <a:prstGeom prst="rect">
+            <a:avLst/>
+          </a:prstGeom>
+          <a:noFill/>
+          <a:ln>
+            <a:solidFill>
+              <a:srgbClr val="3BB752"/>
+            </a:solidFill>
+          </a:ln>
+        </p:spPr>
+        <p:style>
+          <a:lnRef idx="2">
+            <a:schemeClr val="accent1">
+              <a:shade val="50000"/>
+            </a:schemeClr>
+          </a:lnRef>
+          <a:fillRef idx="1">
+            <a:schemeClr val="accent1"/>
+          </a:fillRef>
+          <a:effectRef idx="0">
+            <a:schemeClr val="accent1"/>
+          </a:effectRef>
+          <a:fontRef idx="minor">
+            <a:schemeClr val="lt1"/>
+          </a:fontRef>
+        </p:style>
+        <p:txBody>
+          <a:bodyPr rtlCol="0" anchor="ctr"/>
+          <a:lstStyle/>
+          <a:p>
+            <a:pPr algn="ctr"/>
+            <a:endParaRPr lang="en-US"/>
+          </a:p>
+        </p:txBody>
+      </p:sp>
+    </p:spTree>
+    <p:extLst>
+      <p:ext uri="{BB962C8B-B14F-4D97-AF65-F5344CB8AC3E}">
+        <p14:creationId xmlns:p14="http://schemas.microsoft.com/office/powerpoint/2010/main" val="984934098"/>
+      </p:ext>
+    </p:extLst>
+  </p:cSld>
+  <p:clrMapOvr>
+    <a:masterClrMapping/>
+  </p:clrMapOvr>
+</p:sld>
+</file>
+
 <file path=ppt/theme/theme1.xml><?xml version="1.0" encoding="utf-8"?>
 <a:theme xmlns:a="http://schemas.openxmlformats.org/drawingml/2006/main" name="Office Theme">
   <a:themeElements>

</xml_diff>